<commit_message>
Some descriptive commit message
</commit_message>
<xml_diff>
--- a/gh-pages/html/_downloads/TP1_20161027_introR.pptx
+++ b/gh-pages/html/_downloads/TP1_20161027_introR.pptx
@@ -7,23 +7,23 @@
   <p:sldIdLst>
     <p:sldId id="256" r:id="rId2"/>
     <p:sldId id="257" r:id="rId3"/>
-    <p:sldId id="272" r:id="rId4"/>
-    <p:sldId id="259" r:id="rId5"/>
-    <p:sldId id="260" r:id="rId6"/>
-    <p:sldId id="262" r:id="rId7"/>
-    <p:sldId id="263" r:id="rId8"/>
-    <p:sldId id="264" r:id="rId9"/>
-    <p:sldId id="265" r:id="rId10"/>
-    <p:sldId id="266" r:id="rId11"/>
-    <p:sldId id="267" r:id="rId12"/>
-    <p:sldId id="268" r:id="rId13"/>
-    <p:sldId id="270" r:id="rId14"/>
-    <p:sldId id="269" r:id="rId15"/>
-    <p:sldId id="271" r:id="rId16"/>
-    <p:sldId id="275" r:id="rId17"/>
-    <p:sldId id="273" r:id="rId18"/>
-    <p:sldId id="261" r:id="rId19"/>
-    <p:sldId id="274" r:id="rId20"/>
+    <p:sldId id="276" r:id="rId4"/>
+    <p:sldId id="277" r:id="rId5"/>
+    <p:sldId id="278" r:id="rId6"/>
+    <p:sldId id="259" r:id="rId7"/>
+    <p:sldId id="280" r:id="rId8"/>
+    <p:sldId id="281" r:id="rId9"/>
+    <p:sldId id="282" r:id="rId10"/>
+    <p:sldId id="283" r:id="rId11"/>
+    <p:sldId id="285" r:id="rId12"/>
+    <p:sldId id="286" r:id="rId13"/>
+    <p:sldId id="287" r:id="rId14"/>
+    <p:sldId id="290" r:id="rId15"/>
+    <p:sldId id="291" r:id="rId16"/>
+    <p:sldId id="270" r:id="rId17"/>
+    <p:sldId id="269" r:id="rId18"/>
+    <p:sldId id="284" r:id="rId19"/>
+    <p:sldId id="273" r:id="rId20"/>
   </p:sldIdLst>
   <p:sldSz cx="9144000" cy="6858000" type="screen4x3"/>
   <p:notesSz cx="6858000" cy="9144000"/>
@@ -306,7 +306,7 @@
           <a:p>
             <a:fld id="{E330F08A-8E59-6B4E-A444-1A1858DF76C2}" type="datetimeFigureOut">
               <a:rPr lang="fr-FR" smtClean="0"/>
-              <a:t>10/10/2016</a:t>
+              <a:t>17/10/2016</a:t>
             </a:fld>
             <a:endParaRPr lang="fr-FR"/>
           </a:p>
@@ -476,7 +476,7 @@
           <a:p>
             <a:fld id="{E330F08A-8E59-6B4E-A444-1A1858DF76C2}" type="datetimeFigureOut">
               <a:rPr lang="fr-FR" smtClean="0"/>
-              <a:t>10/10/2016</a:t>
+              <a:t>17/10/2016</a:t>
             </a:fld>
             <a:endParaRPr lang="fr-FR"/>
           </a:p>
@@ -656,7 +656,7 @@
           <a:p>
             <a:fld id="{E330F08A-8E59-6B4E-A444-1A1858DF76C2}" type="datetimeFigureOut">
               <a:rPr lang="fr-FR" smtClean="0"/>
-              <a:t>10/10/2016</a:t>
+              <a:t>17/10/2016</a:t>
             </a:fld>
             <a:endParaRPr lang="fr-FR"/>
           </a:p>
@@ -826,7 +826,7 @@
           <a:p>
             <a:fld id="{E330F08A-8E59-6B4E-A444-1A1858DF76C2}" type="datetimeFigureOut">
               <a:rPr lang="fr-FR" smtClean="0"/>
-              <a:t>10/10/2016</a:t>
+              <a:t>17/10/2016</a:t>
             </a:fld>
             <a:endParaRPr lang="fr-FR"/>
           </a:p>
@@ -1072,7 +1072,7 @@
           <a:p>
             <a:fld id="{E330F08A-8E59-6B4E-A444-1A1858DF76C2}" type="datetimeFigureOut">
               <a:rPr lang="fr-FR" smtClean="0"/>
-              <a:t>10/10/2016</a:t>
+              <a:t>17/10/2016</a:t>
             </a:fld>
             <a:endParaRPr lang="fr-FR"/>
           </a:p>
@@ -1360,7 +1360,7 @@
           <a:p>
             <a:fld id="{E330F08A-8E59-6B4E-A444-1A1858DF76C2}" type="datetimeFigureOut">
               <a:rPr lang="fr-FR" smtClean="0"/>
-              <a:t>10/10/2016</a:t>
+              <a:t>17/10/2016</a:t>
             </a:fld>
             <a:endParaRPr lang="fr-FR"/>
           </a:p>
@@ -1782,7 +1782,7 @@
           <a:p>
             <a:fld id="{E330F08A-8E59-6B4E-A444-1A1858DF76C2}" type="datetimeFigureOut">
               <a:rPr lang="fr-FR" smtClean="0"/>
-              <a:t>10/10/2016</a:t>
+              <a:t>17/10/2016</a:t>
             </a:fld>
             <a:endParaRPr lang="fr-FR"/>
           </a:p>
@@ -1900,7 +1900,7 @@
           <a:p>
             <a:fld id="{E330F08A-8E59-6B4E-A444-1A1858DF76C2}" type="datetimeFigureOut">
               <a:rPr lang="fr-FR" smtClean="0"/>
-              <a:t>10/10/2016</a:t>
+              <a:t>17/10/2016</a:t>
             </a:fld>
             <a:endParaRPr lang="fr-FR"/>
           </a:p>
@@ -1995,7 +1995,7 @@
           <a:p>
             <a:fld id="{E330F08A-8E59-6B4E-A444-1A1858DF76C2}" type="datetimeFigureOut">
               <a:rPr lang="fr-FR" smtClean="0"/>
-              <a:t>10/10/2016</a:t>
+              <a:t>17/10/2016</a:t>
             </a:fld>
             <a:endParaRPr lang="fr-FR"/>
           </a:p>
@@ -2272,7 +2272,7 @@
           <a:p>
             <a:fld id="{E330F08A-8E59-6B4E-A444-1A1858DF76C2}" type="datetimeFigureOut">
               <a:rPr lang="fr-FR" smtClean="0"/>
-              <a:t>10/10/2016</a:t>
+              <a:t>17/10/2016</a:t>
             </a:fld>
             <a:endParaRPr lang="fr-FR"/>
           </a:p>
@@ -2525,7 +2525,7 @@
           <a:p>
             <a:fld id="{E330F08A-8E59-6B4E-A444-1A1858DF76C2}" type="datetimeFigureOut">
               <a:rPr lang="fr-FR" smtClean="0"/>
-              <a:t>10/10/2016</a:t>
+              <a:t>17/10/2016</a:t>
             </a:fld>
             <a:endParaRPr lang="fr-FR"/>
           </a:p>
@@ -2738,7 +2738,7 @@
           <a:p>
             <a:fld id="{E330F08A-8E59-6B4E-A444-1A1858DF76C2}" type="datetimeFigureOut">
               <a:rPr lang="fr-FR" smtClean="0"/>
-              <a:t>10/10/2016</a:t>
+              <a:t>17/10/2016</a:t>
             </a:fld>
             <a:endParaRPr lang="fr-FR"/>
           </a:p>
@@ -3123,12 +3123,21 @@
             <p:ph type="ctrTitle"/>
           </p:nvPr>
         </p:nvSpPr>
-        <p:spPr/>
-        <p:txBody>
-          <a:bodyPr/>
-          <a:lstStyle/>
-          <a:p>
-            <a:endParaRPr lang="fr-FR"/>
+        <p:spPr>
+          <a:xfrm>
+            <a:off x="0" y="2130425"/>
+            <a:ext cx="9144000" cy="1470025"/>
+          </a:xfrm>
+        </p:spPr>
+        <p:txBody>
+          <a:bodyPr/>
+          <a:lstStyle/>
+          <a:p>
+            <a:r>
+              <a:rPr lang="fr-FR" dirty="0" smtClean="0"/>
+              <a:t>Initiation à R</a:t>
+            </a:r>
+            <a:endParaRPr lang="fr-FR" dirty="0"/>
           </a:p>
         </p:txBody>
       </p:sp>
@@ -3142,12 +3151,96 @@
             <p:ph type="subTitle" idx="1"/>
           </p:nvPr>
         </p:nvSpPr>
-        <p:spPr/>
-        <p:txBody>
-          <a:bodyPr/>
-          <a:lstStyle/>
-          <a:p>
-            <a:endParaRPr lang="fr-FR"/>
+        <p:spPr>
+          <a:xfrm>
+            <a:off x="0" y="3886200"/>
+            <a:ext cx="9144000" cy="969108"/>
+          </a:xfrm>
+        </p:spPr>
+        <p:txBody>
+          <a:bodyPr>
+            <a:normAutofit/>
+          </a:bodyPr>
+          <a:lstStyle/>
+          <a:p>
+            <a:r>
+              <a:rPr lang="fr-FR" sz="2000" dirty="0" smtClean="0"/>
+              <a:t>J. </a:t>
+            </a:r>
+            <a:r>
+              <a:rPr lang="fr-FR" sz="2000" dirty="0" err="1" smtClean="0"/>
+              <a:t>Guégan</a:t>
+            </a:r>
+            <a:r>
+              <a:rPr lang="fr-FR" sz="2000" dirty="0" smtClean="0"/>
+              <a:t> – </a:t>
+            </a:r>
+            <a:r>
+              <a:rPr lang="fr-FR" sz="2000" dirty="0" smtClean="0">
+                <a:hlinkClick r:id="rId2"/>
+              </a:rPr>
+              <a:t>j.guegan-ihu@icm-institut.com</a:t>
+            </a:r>
+            <a:endParaRPr lang="fr-FR" sz="2000" dirty="0" smtClean="0"/>
+          </a:p>
+          <a:p>
+            <a:r>
+              <a:rPr lang="fr-FR" sz="2000" dirty="0" err="1" smtClean="0"/>
+              <a:t>G.Meurice</a:t>
+            </a:r>
+            <a:r>
+              <a:rPr lang="fr-FR" sz="2000" dirty="0" smtClean="0"/>
+              <a:t> – </a:t>
+            </a:r>
+            <a:r>
+              <a:rPr lang="fr-FR" sz="2000" dirty="0" smtClean="0">
+                <a:hlinkClick r:id="rId3"/>
+              </a:rPr>
+              <a:t>guillaume.meurice@gustavroussy.fr</a:t>
+            </a:r>
+            <a:endParaRPr lang="fr-FR" sz="2000" dirty="0" smtClean="0"/>
+          </a:p>
+          <a:p>
+            <a:endParaRPr lang="fr-FR" sz="2000" dirty="0"/>
+          </a:p>
+        </p:txBody>
+      </p:sp>
+      <p:sp>
+        <p:nvSpPr>
+          <p:cNvPr id="4" name="ZoneTexte 3"/>
+          <p:cNvSpPr txBox="1"/>
+          <p:nvPr/>
+        </p:nvSpPr>
+        <p:spPr>
+          <a:xfrm>
+            <a:off x="0" y="5773615"/>
+            <a:ext cx="9144000" cy="369332"/>
+          </a:xfrm>
+          <a:prstGeom prst="rect">
+            <a:avLst/>
+          </a:prstGeom>
+          <a:noFill/>
+        </p:spPr>
+        <p:txBody>
+          <a:bodyPr wrap="square" rtlCol="0">
+            <a:spAutoFit/>
+          </a:bodyPr>
+          <a:lstStyle/>
+          <a:p>
+            <a:pPr algn="ctr"/>
+            <a:r>
+              <a:rPr lang="fr-FR" dirty="0" smtClean="0"/>
+              <a:t>Central </a:t>
+            </a:r>
+            <a:r>
+              <a:rPr lang="fr-FR" dirty="0" err="1" smtClean="0"/>
+              <a:t>Supelec</a:t>
+            </a:r>
+            <a:r>
+              <a:rPr lang="fr-FR" dirty="0" smtClean="0"/>
+              <a:t> – 27 octobre 2016</a:t>
+            </a:r>
+            <a:endParaRPr lang="fr-FR" dirty="0"/>
           </a:p>
         </p:txBody>
       </p:sp>
@@ -3197,36 +3290,131 @@
           <a:lstStyle/>
           <a:p>
             <a:r>
+              <a:rPr lang="fr-FR" dirty="0" smtClean="0"/>
+              <a:t>Les types de valeurs</a:t>
+            </a:r>
+            <a:endParaRPr lang="fr-FR" dirty="0"/>
+          </a:p>
+        </p:txBody>
+      </p:sp>
+      <p:sp>
+        <p:nvSpPr>
+          <p:cNvPr id="3" name="Espace réservé du contenu 2"/>
+          <p:cNvSpPr>
+            <a:spLocks noGrp="1"/>
+          </p:cNvSpPr>
+          <p:nvPr>
+            <p:ph idx="1"/>
+          </p:nvPr>
+        </p:nvSpPr>
+        <p:spPr>
+          <a:xfrm>
+            <a:off x="457200" y="1600200"/>
+            <a:ext cx="8229600" cy="5257800"/>
+          </a:xfrm>
+        </p:spPr>
+        <p:txBody>
+          <a:bodyPr>
+            <a:normAutofit/>
+          </a:bodyPr>
+          <a:lstStyle/>
+          <a:p>
+            <a:r>
               <a:rPr lang="fr-FR" dirty="0" err="1" smtClean="0"/>
-              <a:t>Dataframe</a:t>
+              <a:t>Character</a:t>
             </a:r>
             <a:endParaRPr lang="fr-FR" dirty="0"/>
           </a:p>
-        </p:txBody>
-      </p:sp>
-      <p:sp>
-        <p:nvSpPr>
-          <p:cNvPr id="3" name="Espace réservé du contenu 2"/>
-          <p:cNvSpPr>
-            <a:spLocks noGrp="1"/>
-          </p:cNvSpPr>
-          <p:nvPr>
-            <p:ph idx="1"/>
-          </p:nvPr>
-        </p:nvSpPr>
-        <p:spPr/>
-        <p:txBody>
-          <a:bodyPr/>
-          <a:lstStyle/>
-          <a:p>
-            <a:endParaRPr lang="fr-FR"/>
-          </a:p>
-        </p:txBody>
-      </p:sp>
+          <a:p>
+            <a:r>
+              <a:rPr lang="fr-FR" dirty="0" smtClean="0"/>
+              <a:t>Double</a:t>
+            </a:r>
+          </a:p>
+          <a:p>
+            <a:r>
+              <a:rPr lang="fr-FR" dirty="0" err="1" smtClean="0"/>
+              <a:t>Integer</a:t>
+            </a:r>
+            <a:endParaRPr lang="fr-FR" dirty="0"/>
+          </a:p>
+          <a:p>
+            <a:r>
+              <a:rPr lang="fr-FR" dirty="0" err="1" smtClean="0"/>
+              <a:t>Logical</a:t>
+            </a:r>
+            <a:endParaRPr lang="fr-FR" dirty="0" smtClean="0"/>
+          </a:p>
+          <a:p>
+            <a:pPr marL="0" indent="0">
+              <a:buNone/>
+            </a:pPr>
+            <a:endParaRPr lang="fr-FR" dirty="0"/>
+          </a:p>
+          <a:p>
+            <a:pPr marL="0" indent="0">
+              <a:buNone/>
+            </a:pPr>
+            <a:endParaRPr lang="fr-FR" dirty="0"/>
+          </a:p>
+          <a:p>
+            <a:endParaRPr lang="fr-FR" dirty="0"/>
+          </a:p>
+          <a:p>
+            <a:r>
+              <a:rPr lang="fr-FR" dirty="0" smtClean="0"/>
+              <a:t>Valeurs </a:t>
+            </a:r>
+            <a:r>
+              <a:rPr lang="fr-FR" dirty="0"/>
+              <a:t>particulières </a:t>
+            </a:r>
+            <a:r>
+              <a:rPr lang="fr-FR" dirty="0" smtClean="0"/>
+              <a:t>: NA,+</a:t>
+            </a:r>
+            <a:r>
+              <a:rPr lang="fr-FR" dirty="0" err="1" smtClean="0"/>
+              <a:t>Inf,NaN</a:t>
+            </a:r>
+            <a:endParaRPr lang="fr-FR" dirty="0"/>
+          </a:p>
+        </p:txBody>
+      </p:sp>
+      <p:pic>
+        <p:nvPicPr>
+          <p:cNvPr id="5" name="Image 4" descr="Capture d’écran 2016-10-17 à 22.03.26.png"/>
+          <p:cNvPicPr>
+            <a:picLocks noChangeAspect="1"/>
+          </p:cNvPicPr>
+          <p:nvPr/>
+        </p:nvPicPr>
+        <p:blipFill>
+          <a:blip r:embed="rId2">
+            <a:extLst>
+              <a:ext uri="{28A0092B-C50C-407E-A947-70E740481C1C}">
+                <a14:useLocalDpi xmlns:a14="http://schemas.microsoft.com/office/drawing/2010/main" val="0"/>
+              </a:ext>
+            </a:extLst>
+          </a:blip>
+          <a:stretch>
+            <a:fillRect/>
+          </a:stretch>
+        </p:blipFill>
+        <p:spPr>
+          <a:xfrm>
+            <a:off x="2872154" y="986699"/>
+            <a:ext cx="6345115" cy="5236307"/>
+          </a:xfrm>
+          <a:prstGeom prst="rect">
+            <a:avLst/>
+          </a:prstGeom>
+        </p:spPr>
+      </p:pic>
     </p:spTree>
     <p:extLst>
       <p:ext uri="{BB962C8B-B14F-4D97-AF65-F5344CB8AC3E}">
-        <p14:creationId xmlns:p14="http://schemas.microsoft.com/office/powerpoint/2010/main" val="152058204"/>
+        <p14:creationId xmlns:p14="http://schemas.microsoft.com/office/powerpoint/2010/main" val="4226703063"/>
       </p:ext>
     </p:extLst>
   </p:cSld>
@@ -3270,7 +3458,11 @@
           <a:p>
             <a:r>
               <a:rPr lang="fr-FR" dirty="0" smtClean="0"/>
-              <a:t>Listes</a:t>
+              <a:t>Les classes d’</a:t>
+            </a:r>
+            <a:r>
+              <a:rPr lang="fr-FR" dirty="0" err="1" smtClean="0"/>
+              <a:t>objects</a:t>
             </a:r>
             <a:endParaRPr lang="fr-FR" dirty="0"/>
           </a:p>
@@ -3278,7 +3470,7 @@
       </p:sp>
       <p:sp>
         <p:nvSpPr>
-          <p:cNvPr id="3" name="Espace réservé du contenu 2"/>
+          <p:cNvPr id="6" name="Espace réservé du contenu 5"/>
           <p:cNvSpPr>
             <a:spLocks noGrp="1"/>
           </p:cNvSpPr>
@@ -3291,14 +3483,58 @@
           <a:bodyPr/>
           <a:lstStyle/>
           <a:p>
-            <a:endParaRPr lang="fr-FR"/>
-          </a:p>
-        </p:txBody>
-      </p:sp>
+            <a:r>
+              <a:rPr lang="fr-FR" dirty="0" smtClean="0"/>
+              <a:t>Vecteur : </a:t>
+            </a:r>
+          </a:p>
+          <a:p>
+            <a:pPr lvl="1"/>
+            <a:r>
+              <a:rPr lang="fr-FR" dirty="0" smtClean="0"/>
+              <a:t>tout les éléments sont de même nature</a:t>
+            </a:r>
+          </a:p>
+          <a:p>
+            <a:pPr lvl="1"/>
+            <a:endParaRPr lang="fr-FR" dirty="0"/>
+          </a:p>
+        </p:txBody>
+      </p:sp>
+      <p:pic>
+        <p:nvPicPr>
+          <p:cNvPr id="7" name="Image 6" descr="Capture d’écran 2016-10-17 à 22.08.37.png"/>
+          <p:cNvPicPr>
+            <a:picLocks noChangeAspect="1"/>
+          </p:cNvPicPr>
+          <p:nvPr/>
+        </p:nvPicPr>
+        <p:blipFill>
+          <a:blip r:embed="rId2">
+            <a:extLst>
+              <a:ext uri="{28A0092B-C50C-407E-A947-70E740481C1C}">
+                <a14:useLocalDpi xmlns:a14="http://schemas.microsoft.com/office/drawing/2010/main" val="0"/>
+              </a:ext>
+            </a:extLst>
+          </a:blip>
+          <a:stretch>
+            <a:fillRect/>
+          </a:stretch>
+        </p:blipFill>
+        <p:spPr>
+          <a:xfrm>
+            <a:off x="1992923" y="2502765"/>
+            <a:ext cx="4659923" cy="4499678"/>
+          </a:xfrm>
+          <a:prstGeom prst="rect">
+            <a:avLst/>
+          </a:prstGeom>
+        </p:spPr>
+      </p:pic>
     </p:spTree>
     <p:extLst>
       <p:ext uri="{BB962C8B-B14F-4D97-AF65-F5344CB8AC3E}">
-        <p14:creationId xmlns:p14="http://schemas.microsoft.com/office/powerpoint/2010/main" val="152058204"/>
+        <p14:creationId xmlns:p14="http://schemas.microsoft.com/office/powerpoint/2010/main" val="2378012399"/>
       </p:ext>
     </p:extLst>
   </p:cSld>
@@ -3342,7 +3578,11 @@
           <a:p>
             <a:r>
               <a:rPr lang="fr-FR" dirty="0" smtClean="0"/>
-              <a:t>Bloc de code</a:t>
+              <a:t>Les classes d’</a:t>
+            </a:r>
+            <a:r>
+              <a:rPr lang="fr-FR" dirty="0" err="1" smtClean="0"/>
+              <a:t>objects</a:t>
             </a:r>
             <a:endParaRPr lang="fr-FR" dirty="0"/>
           </a:p>
@@ -3350,7 +3590,7 @@
       </p:sp>
       <p:sp>
         <p:nvSpPr>
-          <p:cNvPr id="3" name="Espace réservé du contenu 2"/>
+          <p:cNvPr id="6" name="Espace réservé du contenu 5"/>
           <p:cNvSpPr>
             <a:spLocks noGrp="1"/>
           </p:cNvSpPr>
@@ -3363,14 +3603,58 @@
           <a:bodyPr/>
           <a:lstStyle/>
           <a:p>
-            <a:endParaRPr lang="fr-FR"/>
-          </a:p>
-        </p:txBody>
-      </p:sp>
+            <a:r>
+              <a:rPr lang="fr-FR" dirty="0" smtClean="0"/>
+              <a:t>Facteur :</a:t>
+            </a:r>
+          </a:p>
+          <a:p>
+            <a:pPr lvl="1"/>
+            <a:r>
+              <a:rPr lang="fr-FR" dirty="0" smtClean="0"/>
+              <a:t>Numérique ou caractère</a:t>
+            </a:r>
+          </a:p>
+          <a:p>
+            <a:pPr lvl="1"/>
+            <a:endParaRPr lang="fr-FR" dirty="0"/>
+          </a:p>
+        </p:txBody>
+      </p:sp>
+      <p:pic>
+        <p:nvPicPr>
+          <p:cNvPr id="3" name="Image 2" descr="Capture d’écran 2016-10-17 à 22.11.13.png"/>
+          <p:cNvPicPr>
+            <a:picLocks noChangeAspect="1"/>
+          </p:cNvPicPr>
+          <p:nvPr/>
+        </p:nvPicPr>
+        <p:blipFill>
+          <a:blip r:embed="rId2">
+            <a:extLst>
+              <a:ext uri="{28A0092B-C50C-407E-A947-70E740481C1C}">
+                <a14:useLocalDpi xmlns:a14="http://schemas.microsoft.com/office/drawing/2010/main" val="0"/>
+              </a:ext>
+            </a:extLst>
+          </a:blip>
+          <a:stretch>
+            <a:fillRect/>
+          </a:stretch>
+        </p:blipFill>
+        <p:spPr>
+          <a:xfrm>
+            <a:off x="3536462" y="2588846"/>
+            <a:ext cx="4755055" cy="4591538"/>
+          </a:xfrm>
+          <a:prstGeom prst="rect">
+            <a:avLst/>
+          </a:prstGeom>
+        </p:spPr>
+      </p:pic>
     </p:spTree>
     <p:extLst>
       <p:ext uri="{BB962C8B-B14F-4D97-AF65-F5344CB8AC3E}">
-        <p14:creationId xmlns:p14="http://schemas.microsoft.com/office/powerpoint/2010/main" val="1894432500"/>
+        <p14:creationId xmlns:p14="http://schemas.microsoft.com/office/powerpoint/2010/main" val="3920475195"/>
       </p:ext>
     </p:extLst>
   </p:cSld>
@@ -3414,7 +3698,11 @@
           <a:p>
             <a:r>
               <a:rPr lang="fr-FR" dirty="0" smtClean="0"/>
-              <a:t>Structure algorithmiques</a:t>
+              <a:t>Les classes d’</a:t>
+            </a:r>
+            <a:r>
+              <a:rPr lang="fr-FR" dirty="0" err="1" smtClean="0"/>
+              <a:t>objects</a:t>
             </a:r>
             <a:endParaRPr lang="fr-FR" dirty="0"/>
           </a:p>
@@ -3422,7 +3710,7 @@
       </p:sp>
       <p:sp>
         <p:nvSpPr>
-          <p:cNvPr id="3" name="Espace réservé du contenu 2"/>
+          <p:cNvPr id="6" name="Espace réservé du contenu 5"/>
           <p:cNvSpPr>
             <a:spLocks noGrp="1"/>
           </p:cNvSpPr>
@@ -3437,42 +3725,85 @@
           <a:p>
             <a:r>
               <a:rPr lang="fr-FR" dirty="0" smtClean="0"/>
-              <a:t>Conditionnel</a:t>
+              <a:t>Matrices :</a:t>
             </a:r>
           </a:p>
           <a:p>
             <a:pPr lvl="1"/>
             <a:r>
-              <a:rPr lang="fr-FR" dirty="0" smtClean="0"/>
-              <a:t>If</a:t>
-            </a:r>
-          </a:p>
-          <a:p>
-            <a:pPr lvl="1"/>
+              <a:rPr lang="fr-FR" dirty="0"/>
+              <a:t>tout les éléments sont de même </a:t>
+            </a:r>
+            <a:r>
+              <a:rPr lang="fr-FR" dirty="0" smtClean="0"/>
+              <a:t>nature </a:t>
+            </a:r>
+          </a:p>
+        </p:txBody>
+      </p:sp>
+      <p:pic>
+        <p:nvPicPr>
+          <p:cNvPr id="3" name="Image 2" descr="Capture d’écran 2016-10-17 à 22.15.35.png"/>
+          <p:cNvPicPr>
+            <a:picLocks noChangeAspect="1"/>
+          </p:cNvPicPr>
+          <p:nvPr/>
+        </p:nvPicPr>
+        <p:blipFill>
+          <a:blip r:embed="rId2">
+            <a:extLst>
+              <a:ext uri="{28A0092B-C50C-407E-A947-70E740481C1C}">
+                <a14:useLocalDpi xmlns:a14="http://schemas.microsoft.com/office/drawing/2010/main" val="0"/>
+              </a:ext>
+            </a:extLst>
+          </a:blip>
+          <a:stretch>
+            <a:fillRect/>
+          </a:stretch>
+        </p:blipFill>
+        <p:spPr>
+          <a:xfrm>
+            <a:off x="1103923" y="2486409"/>
+            <a:ext cx="6355372" cy="4449743"/>
+          </a:xfrm>
+          <a:prstGeom prst="rect">
+            <a:avLst/>
+          </a:prstGeom>
+        </p:spPr>
+      </p:pic>
+      <p:sp>
+        <p:nvSpPr>
+          <p:cNvPr id="4" name="ZoneTexte 3"/>
+          <p:cNvSpPr txBox="1"/>
+          <p:nvPr/>
+        </p:nvSpPr>
+        <p:spPr>
+          <a:xfrm>
+            <a:off x="102399" y="6273745"/>
+            <a:ext cx="8692666" cy="369332"/>
+          </a:xfrm>
+          <a:prstGeom prst="rect">
+            <a:avLst/>
+          </a:prstGeom>
+          <a:noFill/>
+        </p:spPr>
+        <p:txBody>
+          <a:bodyPr wrap="none" rtlCol="0">
+            <a:spAutoFit/>
+          </a:bodyPr>
+          <a:lstStyle/>
+          <a:p>
+            <a:r>
+              <a:rPr lang="fr-FR" dirty="0" smtClean="0"/>
+              <a:t>NB : on trouve aussi des « </a:t>
+            </a:r>
             <a:r>
               <a:rPr lang="fr-FR" dirty="0" err="1" smtClean="0"/>
-              <a:t>switch</a:t>
-            </a:r>
-            <a:endParaRPr lang="fr-FR" dirty="0" smtClean="0"/>
-          </a:p>
-          <a:p>
-            <a:r>
-              <a:rPr lang="fr-FR" dirty="0" smtClean="0"/>
-              <a:t>Boucles</a:t>
-            </a:r>
-          </a:p>
-          <a:p>
-            <a:pPr lvl="1"/>
-            <a:r>
-              <a:rPr lang="fr-FR" dirty="0" smtClean="0"/>
-              <a:t>For </a:t>
-            </a:r>
-          </a:p>
-          <a:p>
-            <a:pPr lvl="1"/>
-            <a:r>
-              <a:rPr lang="fr-FR" dirty="0" err="1" smtClean="0"/>
-              <a:t>while</a:t>
+              <a:t>arrays</a:t>
+            </a:r>
+            <a:r>
+              <a:rPr lang="fr-FR" dirty="0" smtClean="0"/>
+              <a:t> », qui sont une généralisation à n-dimension des matrices</a:t>
             </a:r>
             <a:endParaRPr lang="fr-FR" dirty="0"/>
           </a:p>
@@ -3481,7 +3812,7 @@
     </p:spTree>
     <p:extLst>
       <p:ext uri="{BB962C8B-B14F-4D97-AF65-F5344CB8AC3E}">
-        <p14:creationId xmlns:p14="http://schemas.microsoft.com/office/powerpoint/2010/main" val="2184499534"/>
+        <p14:creationId xmlns:p14="http://schemas.microsoft.com/office/powerpoint/2010/main" val="3920475195"/>
       </p:ext>
     </p:extLst>
   </p:cSld>
@@ -3525,7 +3856,11 @@
           <a:p>
             <a:r>
               <a:rPr lang="fr-FR" dirty="0" smtClean="0"/>
-              <a:t>Fonctions</a:t>
+              <a:t>Les classes d’</a:t>
+            </a:r>
+            <a:r>
+              <a:rPr lang="fr-FR" dirty="0" err="1" smtClean="0"/>
+              <a:t>objects</a:t>
             </a:r>
             <a:endParaRPr lang="fr-FR" dirty="0"/>
           </a:p>
@@ -3533,7 +3868,7 @@
       </p:sp>
       <p:sp>
         <p:nvSpPr>
-          <p:cNvPr id="3" name="Espace réservé du contenu 2"/>
+          <p:cNvPr id="6" name="Espace réservé du contenu 5"/>
           <p:cNvSpPr>
             <a:spLocks noGrp="1"/>
           </p:cNvSpPr>
@@ -3546,14 +3881,105 @@
           <a:bodyPr/>
           <a:lstStyle/>
           <a:p>
-            <a:endParaRPr lang="fr-FR"/>
-          </a:p>
-        </p:txBody>
-      </p:sp>
+            <a:r>
+              <a:rPr lang="fr-FR" dirty="0" smtClean="0"/>
+              <a:t>Tableau de données (</a:t>
+            </a:r>
+            <a:r>
+              <a:rPr lang="fr-FR" dirty="0" err="1" smtClean="0"/>
+              <a:t>data.frame</a:t>
+            </a:r>
+            <a:r>
+              <a:rPr lang="fr-FR" dirty="0" smtClean="0"/>
+              <a:t>) :</a:t>
+            </a:r>
+          </a:p>
+          <a:p>
+            <a:pPr lvl="1"/>
+            <a:r>
+              <a:rPr lang="fr-FR" dirty="0" smtClean="0"/>
+              <a:t>structure spéciale </a:t>
+            </a:r>
+            <a:r>
+              <a:rPr lang="fr-FR" dirty="0"/>
+              <a:t>pour les jeux de </a:t>
+            </a:r>
+            <a:r>
+              <a:rPr lang="fr-FR" dirty="0" smtClean="0"/>
+              <a:t>données </a:t>
+            </a:r>
+            <a:r>
+              <a:rPr lang="fr-FR" dirty="0"/>
+              <a:t>de type </a:t>
+            </a:r>
+            <a:r>
+              <a:rPr lang="fr-FR" i="1" dirty="0"/>
+              <a:t>Individus </a:t>
+            </a:r>
+            <a:r>
+              <a:rPr lang="fr-FR" dirty="0"/>
+              <a:t>× </a:t>
+            </a:r>
+            <a:r>
+              <a:rPr lang="fr-FR" i="1" dirty="0" smtClean="0"/>
+              <a:t>Variables</a:t>
+            </a:r>
+          </a:p>
+          <a:p>
+            <a:pPr lvl="1"/>
+            <a:r>
+              <a:rPr lang="fr-FR" dirty="0" smtClean="0"/>
+              <a:t>Les colonnes peuvent être de nature différentes</a:t>
+            </a:r>
+          </a:p>
+          <a:p>
+            <a:pPr lvl="1"/>
+            <a:r>
+              <a:rPr lang="fr-FR" dirty="0" smtClean="0"/>
+              <a:t>Les colonnes doivent être de même taille</a:t>
+            </a:r>
+            <a:r>
+              <a:rPr lang="fr-FR" i="1" dirty="0" smtClean="0"/>
+              <a:t> </a:t>
+            </a:r>
+            <a:endParaRPr lang="fr-FR" dirty="0"/>
+          </a:p>
+        </p:txBody>
+      </p:sp>
+      <p:pic>
+        <p:nvPicPr>
+          <p:cNvPr id="4" name="Image 3" descr="Capture d’écran 2016-10-17 à 22.23.09.png"/>
+          <p:cNvPicPr>
+            <a:picLocks noChangeAspect="1"/>
+          </p:cNvPicPr>
+          <p:nvPr/>
+        </p:nvPicPr>
+        <p:blipFill>
+          <a:blip r:embed="rId2">
+            <a:extLst>
+              <a:ext uri="{28A0092B-C50C-407E-A947-70E740481C1C}">
+                <a14:useLocalDpi xmlns:a14="http://schemas.microsoft.com/office/drawing/2010/main" val="0"/>
+              </a:ext>
+            </a:extLst>
+          </a:blip>
+          <a:stretch>
+            <a:fillRect/>
+          </a:stretch>
+        </p:blipFill>
+        <p:spPr>
+          <a:xfrm>
+            <a:off x="4629791" y="3956538"/>
+            <a:ext cx="3965666" cy="3409461"/>
+          </a:xfrm>
+          <a:prstGeom prst="rect">
+            <a:avLst/>
+          </a:prstGeom>
+        </p:spPr>
+      </p:pic>
     </p:spTree>
     <p:extLst>
       <p:ext uri="{BB962C8B-B14F-4D97-AF65-F5344CB8AC3E}">
-        <p14:creationId xmlns:p14="http://schemas.microsoft.com/office/powerpoint/2010/main" val="2082255176"/>
+        <p14:creationId xmlns:p14="http://schemas.microsoft.com/office/powerpoint/2010/main" val="2472231991"/>
       </p:ext>
     </p:extLst>
   </p:cSld>
@@ -3595,13 +4021,21 @@
           <a:bodyPr/>
           <a:lstStyle/>
           <a:p>
-            <a:endParaRPr lang="fr-FR"/>
-          </a:p>
-        </p:txBody>
-      </p:sp>
-      <p:sp>
-        <p:nvSpPr>
-          <p:cNvPr id="3" name="Espace réservé du contenu 2"/>
+            <a:r>
+              <a:rPr lang="fr-FR" dirty="0" smtClean="0"/>
+              <a:t>Les classes d’</a:t>
+            </a:r>
+            <a:r>
+              <a:rPr lang="fr-FR" dirty="0" err="1" smtClean="0"/>
+              <a:t>objects</a:t>
+            </a:r>
+            <a:endParaRPr lang="fr-FR" dirty="0"/>
+          </a:p>
+        </p:txBody>
+      </p:sp>
+      <p:sp>
+        <p:nvSpPr>
+          <p:cNvPr id="6" name="Espace réservé du contenu 5"/>
           <p:cNvSpPr>
             <a:spLocks noGrp="1"/>
           </p:cNvSpPr>
@@ -3616,16 +4050,53 @@
           <a:p>
             <a:r>
               <a:rPr lang="fr-FR" dirty="0" smtClean="0"/>
-              <a:t>TP1</a:t>
-            </a:r>
-            <a:endParaRPr lang="fr-FR" dirty="0"/>
-          </a:p>
-        </p:txBody>
-      </p:sp>
+              <a:t>Liste : </a:t>
+            </a:r>
+            <a:r>
+              <a:rPr lang="fr-FR" dirty="0" err="1" smtClean="0"/>
+              <a:t>object</a:t>
+            </a:r>
+            <a:r>
+              <a:rPr lang="fr-FR" dirty="0" smtClean="0"/>
+              <a:t> « fourre-tout » :  </a:t>
+            </a:r>
+          </a:p>
+        </p:txBody>
+      </p:sp>
+      <p:pic>
+        <p:nvPicPr>
+          <p:cNvPr id="3" name="Image 2" descr="Capture d’écran 2016-10-17 à 22.28.12.png"/>
+          <p:cNvPicPr>
+            <a:picLocks noChangeAspect="1"/>
+          </p:cNvPicPr>
+          <p:nvPr/>
+        </p:nvPicPr>
+        <p:blipFill>
+          <a:blip r:embed="rId2">
+            <a:extLst>
+              <a:ext uri="{28A0092B-C50C-407E-A947-70E740481C1C}">
+                <a14:useLocalDpi xmlns:a14="http://schemas.microsoft.com/office/drawing/2010/main" val="0"/>
+              </a:ext>
+            </a:extLst>
+          </a:blip>
+          <a:stretch>
+            <a:fillRect/>
+          </a:stretch>
+        </p:blipFill>
+        <p:spPr>
+          <a:xfrm>
+            <a:off x="1602154" y="2042310"/>
+            <a:ext cx="5502044" cy="5079460"/>
+          </a:xfrm>
+          <a:prstGeom prst="rect">
+            <a:avLst/>
+          </a:prstGeom>
+        </p:spPr>
+      </p:pic>
     </p:spTree>
     <p:extLst>
       <p:ext uri="{BB962C8B-B14F-4D97-AF65-F5344CB8AC3E}">
-        <p14:creationId xmlns:p14="http://schemas.microsoft.com/office/powerpoint/2010/main" val="3509124467"/>
+        <p14:creationId xmlns:p14="http://schemas.microsoft.com/office/powerpoint/2010/main" val="1405600416"/>
       </p:ext>
     </p:extLst>
   </p:cSld>
@@ -3669,69 +4140,82 @@
           <a:p>
             <a:r>
               <a:rPr lang="fr-FR" dirty="0" smtClean="0"/>
-              <a:t>Se </a:t>
+              <a:t>Structure algorithmiques</a:t>
+            </a:r>
+            <a:endParaRPr lang="fr-FR" dirty="0"/>
+          </a:p>
+        </p:txBody>
+      </p:sp>
+      <p:sp>
+        <p:nvSpPr>
+          <p:cNvPr id="3" name="Espace réservé du contenu 2"/>
+          <p:cNvSpPr>
+            <a:spLocks noGrp="1"/>
+          </p:cNvSpPr>
+          <p:nvPr>
+            <p:ph idx="1"/>
+          </p:nvPr>
+        </p:nvSpPr>
+        <p:spPr/>
+        <p:txBody>
+          <a:bodyPr/>
+          <a:lstStyle/>
+          <a:p>
+            <a:r>
+              <a:rPr lang="fr-FR" dirty="0" smtClean="0"/>
+              <a:t>Conditionnel</a:t>
+            </a:r>
+          </a:p>
+          <a:p>
+            <a:pPr lvl="1"/>
+            <a:r>
+              <a:rPr lang="fr-FR" dirty="0" smtClean="0"/>
+              <a:t>If / </a:t>
             </a:r>
             <a:r>
               <a:rPr lang="fr-FR" dirty="0" err="1" smtClean="0"/>
-              <a:t>deplacer</a:t>
-            </a:r>
-            <a:r>
-              <a:rPr lang="fr-FR" dirty="0" smtClean="0"/>
-              <a:t> dans R</a:t>
-            </a:r>
-            <a:endParaRPr lang="fr-FR" dirty="0"/>
-          </a:p>
-        </p:txBody>
-      </p:sp>
-      <p:sp>
-        <p:nvSpPr>
-          <p:cNvPr id="3" name="Espace réservé du contenu 2"/>
-          <p:cNvSpPr>
-            <a:spLocks noGrp="1"/>
-          </p:cNvSpPr>
-          <p:nvPr>
-            <p:ph idx="1"/>
-          </p:nvPr>
-        </p:nvSpPr>
-        <p:spPr/>
-        <p:txBody>
-          <a:bodyPr/>
-          <a:lstStyle/>
-          <a:p>
+              <a:t>else</a:t>
+            </a:r>
+            <a:endParaRPr lang="fr-FR" dirty="0" smtClean="0"/>
+          </a:p>
+          <a:p>
+            <a:pPr lvl="1"/>
+            <a:r>
+              <a:rPr lang="fr-FR" dirty="0" err="1"/>
+              <a:t>s</a:t>
+            </a:r>
             <a:r>
               <a:rPr lang="fr-FR" dirty="0" err="1" smtClean="0"/>
-              <a:t>Getwd</a:t>
+              <a:t>witch</a:t>
             </a:r>
             <a:endParaRPr lang="fr-FR" dirty="0" smtClean="0"/>
           </a:p>
           <a:p>
+            <a:pPr lvl="1"/>
+            <a:endParaRPr lang="fr-FR" dirty="0" smtClean="0"/>
+          </a:p>
+          <a:p>
+            <a:r>
+              <a:rPr lang="fr-FR" dirty="0" smtClean="0"/>
+              <a:t>Boucles</a:t>
+            </a:r>
+          </a:p>
+          <a:p>
+            <a:pPr lvl="1"/>
+            <a:r>
+              <a:rPr lang="fr-FR" dirty="0"/>
+              <a:t>f</a:t>
+            </a:r>
+            <a:r>
+              <a:rPr lang="fr-FR" dirty="0" smtClean="0"/>
+              <a:t>or </a:t>
+            </a:r>
+          </a:p>
+          <a:p>
+            <a:pPr lvl="1"/>
             <a:r>
               <a:rPr lang="fr-FR" dirty="0" err="1" smtClean="0"/>
-              <a:t>Setwd</a:t>
-            </a:r>
-            <a:r>
-              <a:rPr lang="fr-FR" dirty="0" smtClean="0"/>
-              <a:t>()</a:t>
-            </a:r>
-          </a:p>
-          <a:p>
-            <a:r>
-              <a:rPr lang="fr-FR" dirty="0" err="1" smtClean="0"/>
-              <a:t>Dir</a:t>
-            </a:r>
-            <a:r>
-              <a:rPr lang="fr-FR" dirty="0" smtClean="0"/>
-              <a:t>()</a:t>
-            </a:r>
-          </a:p>
-          <a:p>
-            <a:r>
-              <a:rPr lang="fr-FR" dirty="0" err="1" smtClean="0"/>
-              <a:t>Ls</a:t>
-            </a:r>
-            <a:r>
-              <a:rPr lang="fr-FR" dirty="0" smtClean="0"/>
-              <a:t>()</a:t>
+              <a:t>while</a:t>
             </a:r>
             <a:endParaRPr lang="fr-FR" dirty="0"/>
           </a:p>
@@ -3740,7 +4224,7 @@
     </p:spTree>
     <p:extLst>
       <p:ext uri="{BB962C8B-B14F-4D97-AF65-F5344CB8AC3E}">
-        <p14:creationId xmlns:p14="http://schemas.microsoft.com/office/powerpoint/2010/main" val="1862273286"/>
+        <p14:creationId xmlns:p14="http://schemas.microsoft.com/office/powerpoint/2010/main" val="2184499534"/>
       </p:ext>
     </p:extLst>
   </p:cSld>
@@ -3784,15 +4268,722 @@
           <a:p>
             <a:r>
               <a:rPr lang="fr-FR" dirty="0" smtClean="0"/>
+              <a:t>Fonctions</a:t>
+            </a:r>
+            <a:endParaRPr lang="fr-FR" dirty="0"/>
+          </a:p>
+        </p:txBody>
+      </p:sp>
+      <p:grpSp>
+        <p:nvGrpSpPr>
+          <p:cNvPr id="18" name="Grouper 17"/>
+          <p:cNvGrpSpPr/>
+          <p:nvPr/>
+        </p:nvGrpSpPr>
+        <p:grpSpPr>
+          <a:xfrm>
+            <a:off x="809807" y="2795899"/>
+            <a:ext cx="7876993" cy="3741669"/>
+            <a:chOff x="1062893" y="1662668"/>
+            <a:chExt cx="7876993" cy="3741669"/>
+          </a:xfrm>
+        </p:grpSpPr>
+        <p:sp>
+          <p:nvSpPr>
+            <p:cNvPr id="4" name="Espace réservé du contenu 2"/>
+            <p:cNvSpPr txBox="1">
+              <a:spLocks/>
+            </p:cNvSpPr>
+            <p:nvPr/>
+          </p:nvSpPr>
+          <p:spPr>
+            <a:xfrm>
+              <a:off x="1062893" y="2543483"/>
+              <a:ext cx="5931876" cy="2302056"/>
+            </a:xfrm>
+            <a:prstGeom prst="rect">
+              <a:avLst/>
+            </a:prstGeom>
+            <a:solidFill>
+              <a:schemeClr val="bg1">
+                <a:lumMod val="95000"/>
+              </a:schemeClr>
+            </a:solidFill>
+          </p:spPr>
+          <p:txBody>
+            <a:bodyPr vert="horz" lIns="91440" tIns="45720" rIns="91440" bIns="45720" rtlCol="0">
+              <a:noAutofit/>
+            </a:bodyPr>
+            <a:lstStyle>
+              <a:lvl1pPr marL="342900" indent="-342900" algn="l" defTabSz="457200" rtl="0" eaLnBrk="1" latinLnBrk="0" hangingPunct="1">
+                <a:spcBef>
+                  <a:spcPct val="20000"/>
+                </a:spcBef>
+                <a:buFont typeface="Arial"/>
+                <a:buChar char="•"/>
+                <a:defRPr sz="3200" kern="1200">
+                  <a:solidFill>
+                    <a:schemeClr val="tx1"/>
+                  </a:solidFill>
+                  <a:latin typeface="+mn-lt"/>
+                  <a:ea typeface="+mn-ea"/>
+                  <a:cs typeface="+mn-cs"/>
+                </a:defRPr>
+              </a:lvl1pPr>
+              <a:lvl2pPr marL="742950" indent="-285750" algn="l" defTabSz="457200" rtl="0" eaLnBrk="1" latinLnBrk="0" hangingPunct="1">
+                <a:spcBef>
+                  <a:spcPct val="20000"/>
+                </a:spcBef>
+                <a:buFont typeface="Arial"/>
+                <a:buChar char="–"/>
+                <a:defRPr sz="2800" kern="1200">
+                  <a:solidFill>
+                    <a:schemeClr val="tx1"/>
+                  </a:solidFill>
+                  <a:latin typeface="+mn-lt"/>
+                  <a:ea typeface="+mn-ea"/>
+                  <a:cs typeface="+mn-cs"/>
+                </a:defRPr>
+              </a:lvl2pPr>
+              <a:lvl3pPr marL="1143000" indent="-228600" algn="l" defTabSz="457200" rtl="0" eaLnBrk="1" latinLnBrk="0" hangingPunct="1">
+                <a:spcBef>
+                  <a:spcPct val="20000"/>
+                </a:spcBef>
+                <a:buFont typeface="Arial"/>
+                <a:buChar char="•"/>
+                <a:defRPr sz="2400" kern="1200">
+                  <a:solidFill>
+                    <a:schemeClr val="tx1"/>
+                  </a:solidFill>
+                  <a:latin typeface="+mn-lt"/>
+                  <a:ea typeface="+mn-ea"/>
+                  <a:cs typeface="+mn-cs"/>
+                </a:defRPr>
+              </a:lvl3pPr>
+              <a:lvl4pPr marL="1600200" indent="-228600" algn="l" defTabSz="457200" rtl="0" eaLnBrk="1" latinLnBrk="0" hangingPunct="1">
+                <a:spcBef>
+                  <a:spcPct val="20000"/>
+                </a:spcBef>
+                <a:buFont typeface="Arial"/>
+                <a:buChar char="–"/>
+                <a:defRPr sz="2000" kern="1200">
+                  <a:solidFill>
+                    <a:schemeClr val="tx1"/>
+                  </a:solidFill>
+                  <a:latin typeface="+mn-lt"/>
+                  <a:ea typeface="+mn-ea"/>
+                  <a:cs typeface="+mn-cs"/>
+                </a:defRPr>
+              </a:lvl4pPr>
+              <a:lvl5pPr marL="2057400" indent="-228600" algn="l" defTabSz="457200" rtl="0" eaLnBrk="1" latinLnBrk="0" hangingPunct="1">
+                <a:spcBef>
+                  <a:spcPct val="20000"/>
+                </a:spcBef>
+                <a:buFont typeface="Arial"/>
+                <a:buChar char="»"/>
+                <a:defRPr sz="2000" kern="1200">
+                  <a:solidFill>
+                    <a:schemeClr val="tx1"/>
+                  </a:solidFill>
+                  <a:latin typeface="+mn-lt"/>
+                  <a:ea typeface="+mn-ea"/>
+                  <a:cs typeface="+mn-cs"/>
+                </a:defRPr>
+              </a:lvl5pPr>
+              <a:lvl6pPr marL="2514600" indent="-228600" algn="l" defTabSz="457200" rtl="0" eaLnBrk="1" latinLnBrk="0" hangingPunct="1">
+                <a:spcBef>
+                  <a:spcPct val="20000"/>
+                </a:spcBef>
+                <a:buFont typeface="Arial"/>
+                <a:buChar char="•"/>
+                <a:defRPr sz="2000" kern="1200">
+                  <a:solidFill>
+                    <a:schemeClr val="tx1"/>
+                  </a:solidFill>
+                  <a:latin typeface="+mn-lt"/>
+                  <a:ea typeface="+mn-ea"/>
+                  <a:cs typeface="+mn-cs"/>
+                </a:defRPr>
+              </a:lvl6pPr>
+              <a:lvl7pPr marL="2971800" indent="-228600" algn="l" defTabSz="457200" rtl="0" eaLnBrk="1" latinLnBrk="0" hangingPunct="1">
+                <a:spcBef>
+                  <a:spcPct val="20000"/>
+                </a:spcBef>
+                <a:buFont typeface="Arial"/>
+                <a:buChar char="•"/>
+                <a:defRPr sz="2000" kern="1200">
+                  <a:solidFill>
+                    <a:schemeClr val="tx1"/>
+                  </a:solidFill>
+                  <a:latin typeface="+mn-lt"/>
+                  <a:ea typeface="+mn-ea"/>
+                  <a:cs typeface="+mn-cs"/>
+                </a:defRPr>
+              </a:lvl7pPr>
+              <a:lvl8pPr marL="3429000" indent="-228600" algn="l" defTabSz="457200" rtl="0" eaLnBrk="1" latinLnBrk="0" hangingPunct="1">
+                <a:spcBef>
+                  <a:spcPct val="20000"/>
+                </a:spcBef>
+                <a:buFont typeface="Arial"/>
+                <a:buChar char="•"/>
+                <a:defRPr sz="2000" kern="1200">
+                  <a:solidFill>
+                    <a:schemeClr val="tx1"/>
+                  </a:solidFill>
+                  <a:latin typeface="+mn-lt"/>
+                  <a:ea typeface="+mn-ea"/>
+                  <a:cs typeface="+mn-cs"/>
+                </a:defRPr>
+              </a:lvl8pPr>
+              <a:lvl9pPr marL="3886200" indent="-228600" algn="l" defTabSz="457200" rtl="0" eaLnBrk="1" latinLnBrk="0" hangingPunct="1">
+                <a:spcBef>
+                  <a:spcPct val="20000"/>
+                </a:spcBef>
+                <a:buFont typeface="Arial"/>
+                <a:buChar char="•"/>
+                <a:defRPr sz="2000" kern="1200">
+                  <a:solidFill>
+                    <a:schemeClr val="tx1"/>
+                  </a:solidFill>
+                  <a:latin typeface="+mn-lt"/>
+                  <a:ea typeface="+mn-ea"/>
+                  <a:cs typeface="+mn-cs"/>
+                </a:defRPr>
+              </a:lvl9pPr>
+            </a:lstStyle>
+            <a:p>
+              <a:pPr marL="0" indent="0">
+                <a:buFont typeface="Arial"/>
+                <a:buNone/>
+              </a:pPr>
+              <a:r>
+                <a:rPr lang="fr-FR" sz="2400" dirty="0" err="1" smtClean="0">
+                  <a:latin typeface="Monaco"/>
+                  <a:cs typeface="Monaco"/>
+                </a:rPr>
+                <a:t>Monexemple</a:t>
+              </a:r>
+              <a:r>
+                <a:rPr lang="fr-FR" sz="2400" dirty="0" smtClean="0">
+                  <a:latin typeface="Monaco"/>
+                  <a:cs typeface="Monaco"/>
+                </a:rPr>
+                <a:t> &lt;- </a:t>
+              </a:r>
+              <a:r>
+                <a:rPr lang="fr-FR" sz="2400" b="1" dirty="0" err="1" smtClean="0">
+                  <a:latin typeface="Monaco"/>
+                  <a:cs typeface="Monaco"/>
+                </a:rPr>
+                <a:t>function</a:t>
+              </a:r>
+              <a:r>
+                <a:rPr lang="fr-FR" sz="2400" dirty="0" smtClean="0">
+                  <a:latin typeface="Monaco"/>
+                  <a:cs typeface="Monaco"/>
+                </a:rPr>
+                <a:t>(A,B){</a:t>
+              </a:r>
+            </a:p>
+            <a:p>
+              <a:pPr marL="0" indent="0">
+                <a:buFont typeface="Arial"/>
+                <a:buNone/>
+              </a:pPr>
+              <a:r>
+                <a:rPr lang="fr-FR" sz="2400" dirty="0" smtClean="0">
+                  <a:latin typeface="Monaco"/>
+                  <a:cs typeface="Monaco"/>
+                </a:rPr>
+                <a:t>	out&lt;-(A+B)^2	</a:t>
+              </a:r>
+            </a:p>
+            <a:p>
+              <a:pPr marL="0" indent="0">
+                <a:buFont typeface="Arial"/>
+                <a:buNone/>
+              </a:pPr>
+              <a:r>
+                <a:rPr lang="fr-FR" sz="2400" dirty="0" smtClean="0">
+                  <a:latin typeface="Monaco"/>
+                  <a:cs typeface="Monaco"/>
+                </a:rPr>
+                <a:t>	out&lt;-out + A</a:t>
+              </a:r>
+            </a:p>
+            <a:p>
+              <a:pPr marL="0" indent="0">
+                <a:buFont typeface="Arial"/>
+                <a:buNone/>
+              </a:pPr>
+              <a:r>
+                <a:rPr lang="fr-FR" sz="2400" b="1" dirty="0" smtClean="0">
+                  <a:latin typeface="Monaco"/>
+                  <a:cs typeface="Monaco"/>
+                </a:rPr>
+                <a:t>	return</a:t>
+              </a:r>
+              <a:r>
+                <a:rPr lang="fr-FR" sz="2400" dirty="0" smtClean="0">
+                  <a:latin typeface="Monaco"/>
+                  <a:cs typeface="Monaco"/>
+                </a:rPr>
+                <a:t>(out)</a:t>
+              </a:r>
+            </a:p>
+            <a:p>
+              <a:pPr marL="0" indent="0">
+                <a:buFont typeface="Arial"/>
+                <a:buNone/>
+              </a:pPr>
+              <a:r>
+                <a:rPr lang="fr-FR" sz="2400" dirty="0" smtClean="0">
+                  <a:latin typeface="Monaco"/>
+                  <a:cs typeface="Monaco"/>
+                </a:rPr>
+                <a:t>}</a:t>
+              </a:r>
+              <a:endParaRPr lang="fr-FR" sz="2400" dirty="0">
+                <a:latin typeface="Monaco"/>
+                <a:cs typeface="Monaco"/>
+              </a:endParaRPr>
+            </a:p>
+          </p:txBody>
+        </p:sp>
+        <p:sp>
+          <p:nvSpPr>
+            <p:cNvPr id="5" name="ZoneTexte 4"/>
+            <p:cNvSpPr txBox="1"/>
+            <p:nvPr/>
+          </p:nvSpPr>
+          <p:spPr>
+            <a:xfrm>
+              <a:off x="1342157" y="1662668"/>
+              <a:ext cx="1978689" cy="369332"/>
+            </a:xfrm>
+            <a:prstGeom prst="rect">
+              <a:avLst/>
+            </a:prstGeom>
+            <a:noFill/>
+          </p:spPr>
+          <p:txBody>
+            <a:bodyPr wrap="none" rtlCol="0">
+              <a:spAutoFit/>
+            </a:bodyPr>
+            <a:lstStyle/>
+            <a:p>
+              <a:r>
+                <a:rPr lang="fr-FR" dirty="0" smtClean="0"/>
+                <a:t>Nom de la fonction</a:t>
+              </a:r>
+              <a:endParaRPr lang="fr-FR" dirty="0"/>
+            </a:p>
+          </p:txBody>
+        </p:sp>
+        <p:sp>
+          <p:nvSpPr>
+            <p:cNvPr id="6" name="ZoneTexte 5"/>
+            <p:cNvSpPr txBox="1"/>
+            <p:nvPr/>
+          </p:nvSpPr>
+          <p:spPr>
+            <a:xfrm>
+              <a:off x="1547294" y="5035005"/>
+              <a:ext cx="3373715" cy="369332"/>
+            </a:xfrm>
+            <a:prstGeom prst="rect">
+              <a:avLst/>
+            </a:prstGeom>
+            <a:noFill/>
+          </p:spPr>
+          <p:txBody>
+            <a:bodyPr wrap="none" rtlCol="0">
+              <a:spAutoFit/>
+            </a:bodyPr>
+            <a:lstStyle/>
+            <a:p>
+              <a:r>
+                <a:rPr lang="fr-FR" dirty="0" smtClean="0"/>
+                <a:t>Variable retournée par la fonction</a:t>
+              </a:r>
+              <a:endParaRPr lang="fr-FR" dirty="0"/>
+            </a:p>
+          </p:txBody>
+        </p:sp>
+        <p:sp>
+          <p:nvSpPr>
+            <p:cNvPr id="7" name="ZoneTexte 6"/>
+            <p:cNvSpPr txBox="1"/>
+            <p:nvPr/>
+          </p:nvSpPr>
+          <p:spPr>
+            <a:xfrm>
+              <a:off x="5054604" y="1662668"/>
+              <a:ext cx="1274708" cy="369332"/>
+            </a:xfrm>
+            <a:prstGeom prst="rect">
+              <a:avLst/>
+            </a:prstGeom>
+            <a:noFill/>
+          </p:spPr>
+          <p:txBody>
+            <a:bodyPr wrap="none" rtlCol="0">
+              <a:spAutoFit/>
+            </a:bodyPr>
+            <a:lstStyle/>
+            <a:p>
+              <a:r>
+                <a:rPr lang="fr-FR" dirty="0" err="1" smtClean="0"/>
+                <a:t>parametres</a:t>
+              </a:r>
+              <a:endParaRPr lang="fr-FR" dirty="0"/>
+            </a:p>
+          </p:txBody>
+        </p:sp>
+        <p:cxnSp>
+          <p:nvCxnSpPr>
+            <p:cNvPr id="9" name="Connecteur droit avec flèche 8"/>
+            <p:cNvCxnSpPr/>
+            <p:nvPr/>
+          </p:nvCxnSpPr>
+          <p:spPr>
+            <a:xfrm flipH="1">
+              <a:off x="5656385" y="2032000"/>
+              <a:ext cx="19538" cy="674077"/>
+            </a:xfrm>
+            <a:prstGeom prst="straightConnector1">
+              <a:avLst/>
+            </a:prstGeom>
+            <a:ln>
+              <a:tailEnd type="arrow"/>
+            </a:ln>
+          </p:spPr>
+          <p:style>
+            <a:lnRef idx="2">
+              <a:schemeClr val="accent1"/>
+            </a:lnRef>
+            <a:fillRef idx="0">
+              <a:schemeClr val="accent1"/>
+            </a:fillRef>
+            <a:effectRef idx="1">
+              <a:schemeClr val="accent1"/>
+            </a:effectRef>
+            <a:fontRef idx="minor">
+              <a:schemeClr val="tx1"/>
+            </a:fontRef>
+          </p:style>
+        </p:cxnSp>
+        <p:cxnSp>
+          <p:nvCxnSpPr>
+            <p:cNvPr id="10" name="Connecteur droit avec flèche 9"/>
+            <p:cNvCxnSpPr/>
+            <p:nvPr/>
+          </p:nvCxnSpPr>
+          <p:spPr>
+            <a:xfrm flipH="1">
+              <a:off x="2145324" y="2032000"/>
+              <a:ext cx="19538" cy="674077"/>
+            </a:xfrm>
+            <a:prstGeom prst="straightConnector1">
+              <a:avLst/>
+            </a:prstGeom>
+            <a:ln>
+              <a:tailEnd type="arrow"/>
+            </a:ln>
+          </p:spPr>
+          <p:style>
+            <a:lnRef idx="2">
+              <a:schemeClr val="accent1"/>
+            </a:lnRef>
+            <a:fillRef idx="0">
+              <a:schemeClr val="accent1"/>
+            </a:fillRef>
+            <a:effectRef idx="1">
+              <a:schemeClr val="accent1"/>
+            </a:effectRef>
+            <a:fontRef idx="minor">
+              <a:schemeClr val="tx1"/>
+            </a:fontRef>
+          </p:style>
+        </p:cxnSp>
+        <p:cxnSp>
+          <p:nvCxnSpPr>
+            <p:cNvPr id="11" name="Connecteur droit avec flèche 10"/>
+            <p:cNvCxnSpPr>
+              <a:stCxn id="6" idx="0"/>
+            </p:cNvCxnSpPr>
+            <p:nvPr/>
+          </p:nvCxnSpPr>
+          <p:spPr>
+            <a:xfrm flipV="1">
+              <a:off x="3234152" y="4275015"/>
+              <a:ext cx="0" cy="759990"/>
+            </a:xfrm>
+            <a:prstGeom prst="straightConnector1">
+              <a:avLst/>
+            </a:prstGeom>
+            <a:ln>
+              <a:tailEnd type="arrow"/>
+            </a:ln>
+          </p:spPr>
+          <p:style>
+            <a:lnRef idx="2">
+              <a:schemeClr val="accent1"/>
+            </a:lnRef>
+            <a:fillRef idx="0">
+              <a:schemeClr val="accent1"/>
+            </a:fillRef>
+            <a:effectRef idx="1">
+              <a:schemeClr val="accent1"/>
+            </a:effectRef>
+            <a:fontRef idx="minor">
+              <a:schemeClr val="tx1"/>
+            </a:fontRef>
+          </p:style>
+        </p:cxnSp>
+        <p:sp>
+          <p:nvSpPr>
+            <p:cNvPr id="15" name="Accolade fermante 14"/>
+            <p:cNvSpPr/>
+            <p:nvPr/>
+          </p:nvSpPr>
+          <p:spPr>
+            <a:xfrm>
+              <a:off x="7033846" y="2543483"/>
+              <a:ext cx="527538" cy="2328928"/>
+            </a:xfrm>
+            <a:prstGeom prst="rightBrace">
+              <a:avLst/>
+            </a:prstGeom>
+          </p:spPr>
+          <p:style>
+            <a:lnRef idx="2">
+              <a:schemeClr val="accent1"/>
+            </a:lnRef>
+            <a:fillRef idx="0">
+              <a:schemeClr val="accent1"/>
+            </a:fillRef>
+            <a:effectRef idx="1">
+              <a:schemeClr val="accent1"/>
+            </a:effectRef>
+            <a:fontRef idx="minor">
+              <a:schemeClr val="tx1"/>
+            </a:fontRef>
+          </p:style>
+          <p:txBody>
+            <a:bodyPr rtlCol="0" anchor="ctr"/>
+            <a:lstStyle/>
+            <a:p>
+              <a:pPr algn="ctr"/>
+              <a:endParaRPr lang="fr-FR"/>
+            </a:p>
+          </p:txBody>
+        </p:sp>
+        <p:sp>
+          <p:nvSpPr>
+            <p:cNvPr id="16" name="ZoneTexte 15"/>
+            <p:cNvSpPr txBox="1"/>
+            <p:nvPr/>
+          </p:nvSpPr>
+          <p:spPr>
+            <a:xfrm>
+              <a:off x="7561384" y="3507155"/>
+              <a:ext cx="1378502" cy="369332"/>
+            </a:xfrm>
+            <a:prstGeom prst="rect">
+              <a:avLst/>
+            </a:prstGeom>
+            <a:noFill/>
+          </p:spPr>
+          <p:txBody>
+            <a:bodyPr wrap="none" rtlCol="0">
+              <a:spAutoFit/>
+            </a:bodyPr>
+            <a:lstStyle/>
+            <a:p>
+              <a:r>
+                <a:rPr lang="fr-FR" dirty="0" smtClean="0"/>
+                <a:t>Bloc de code</a:t>
+              </a:r>
+              <a:endParaRPr lang="fr-FR" dirty="0"/>
+            </a:p>
+          </p:txBody>
+        </p:sp>
+      </p:grpSp>
+      <p:sp>
+        <p:nvSpPr>
+          <p:cNvPr id="19" name="Espace réservé du contenu 2"/>
+          <p:cNvSpPr>
+            <a:spLocks noGrp="1"/>
+          </p:cNvSpPr>
+          <p:nvPr>
+            <p:ph idx="1"/>
+          </p:nvPr>
+        </p:nvSpPr>
+        <p:spPr>
+          <a:xfrm>
+            <a:off x="457200" y="1600201"/>
+            <a:ext cx="8229600" cy="1350108"/>
+          </a:xfrm>
+        </p:spPr>
+        <p:txBody>
+          <a:bodyPr/>
+          <a:lstStyle/>
+          <a:p>
+            <a:r>
+              <a:rPr lang="fr-FR" dirty="0"/>
+              <a:t>Une fonction permet de transformer </a:t>
+            </a:r>
+            <a:r>
+              <a:rPr lang="fr-FR" dirty="0" smtClean="0"/>
+              <a:t>des arguments </a:t>
+            </a:r>
+            <a:r>
+              <a:rPr lang="fr-FR" dirty="0"/>
+              <a:t>(inputs) en résultats (outputs).</a:t>
+            </a:r>
+          </a:p>
+        </p:txBody>
+      </p:sp>
+    </p:spTree>
+    <p:extLst>
+      <p:ext uri="{BB962C8B-B14F-4D97-AF65-F5344CB8AC3E}">
+        <p14:creationId xmlns:p14="http://schemas.microsoft.com/office/powerpoint/2010/main" val="2082255176"/>
+      </p:ext>
+    </p:extLst>
+  </p:cSld>
+  <p:clrMapOvr>
+    <a:masterClrMapping/>
+  </p:clrMapOvr>
+</p:sld>
+</file>
+
+<file path=ppt/slides/slide18.xml><?xml version="1.0" encoding="utf-8"?>
+<p:sld xmlns:a="http://schemas.openxmlformats.org/drawingml/2006/main" xmlns:r="http://schemas.openxmlformats.org/officeDocument/2006/relationships" xmlns:p="http://schemas.openxmlformats.org/presentationml/2006/main">
+  <p:cSld>
+    <p:spTree>
+      <p:nvGrpSpPr>
+        <p:cNvPr id="1" name=""/>
+        <p:cNvGrpSpPr/>
+        <p:nvPr/>
+      </p:nvGrpSpPr>
+      <p:grpSpPr>
+        <a:xfrm>
+          <a:off x="0" y="0"/>
+          <a:ext cx="0" cy="0"/>
+          <a:chOff x="0" y="0"/>
+          <a:chExt cx="0" cy="0"/>
+        </a:xfrm>
+      </p:grpSpPr>
+      <p:sp>
+        <p:nvSpPr>
+          <p:cNvPr id="2" name="Titre 1"/>
+          <p:cNvSpPr>
+            <a:spLocks noGrp="1"/>
+          </p:cNvSpPr>
+          <p:nvPr>
+            <p:ph type="title"/>
+          </p:nvPr>
+        </p:nvSpPr>
+        <p:spPr/>
+        <p:txBody>
+          <a:bodyPr/>
+          <a:lstStyle/>
+          <a:p>
+            <a:r>
+              <a:rPr lang="fr-FR" dirty="0" smtClean="0"/>
+              <a:t>Opérateurs</a:t>
+            </a:r>
+            <a:endParaRPr lang="fr-FR" dirty="0"/>
+          </a:p>
+        </p:txBody>
+      </p:sp>
+      <p:pic>
+        <p:nvPicPr>
+          <p:cNvPr id="5" name="Image 4" descr="Capture d’écran 2016-10-17 à 21.53.00.png"/>
+          <p:cNvPicPr>
+            <a:picLocks noChangeAspect="1"/>
+          </p:cNvPicPr>
+          <p:nvPr/>
+        </p:nvPicPr>
+        <p:blipFill>
+          <a:blip r:embed="rId2">
+            <a:extLst>
+              <a:ext uri="{28A0092B-C50C-407E-A947-70E740481C1C}">
+                <a14:useLocalDpi xmlns:a14="http://schemas.microsoft.com/office/drawing/2010/main" val="0"/>
+              </a:ext>
+            </a:extLst>
+          </a:blip>
+          <a:stretch>
+            <a:fillRect/>
+          </a:stretch>
+        </p:blipFill>
+        <p:spPr>
+          <a:xfrm>
+            <a:off x="1078035" y="2059354"/>
+            <a:ext cx="6616700" cy="3149600"/>
+          </a:xfrm>
+          <a:prstGeom prst="rect">
+            <a:avLst/>
+          </a:prstGeom>
+        </p:spPr>
+      </p:pic>
+    </p:spTree>
+    <p:extLst>
+      <p:ext uri="{BB962C8B-B14F-4D97-AF65-F5344CB8AC3E}">
+        <p14:creationId xmlns:p14="http://schemas.microsoft.com/office/powerpoint/2010/main" val="2718787706"/>
+      </p:ext>
+    </p:extLst>
+  </p:cSld>
+  <p:clrMapOvr>
+    <a:masterClrMapping/>
+  </p:clrMapOvr>
+</p:sld>
+</file>
+
+<file path=ppt/slides/slide19.xml><?xml version="1.0" encoding="utf-8"?>
+<p:sld xmlns:a="http://schemas.openxmlformats.org/drawingml/2006/main" xmlns:r="http://schemas.openxmlformats.org/officeDocument/2006/relationships" xmlns:p="http://schemas.openxmlformats.org/presentationml/2006/main">
+  <p:cSld>
+    <p:spTree>
+      <p:nvGrpSpPr>
+        <p:cNvPr id="1" name=""/>
+        <p:cNvGrpSpPr/>
+        <p:nvPr/>
+      </p:nvGrpSpPr>
+      <p:grpSpPr>
+        <a:xfrm>
+          <a:off x="0" y="0"/>
+          <a:ext cx="0" cy="0"/>
+          <a:chOff x="0" y="0"/>
+          <a:chExt cx="0" cy="0"/>
+        </a:xfrm>
+      </p:grpSpPr>
+      <p:sp>
+        <p:nvSpPr>
+          <p:cNvPr id="2" name="Titre 1"/>
+          <p:cNvSpPr>
+            <a:spLocks noGrp="1"/>
+          </p:cNvSpPr>
+          <p:nvPr>
+            <p:ph type="title"/>
+          </p:nvPr>
+        </p:nvSpPr>
+        <p:spPr/>
+        <p:txBody>
+          <a:bodyPr/>
+          <a:lstStyle/>
+          <a:p>
+            <a:r>
+              <a:rPr lang="fr-FR" dirty="0" smtClean="0"/>
               <a:t>Lire et </a:t>
             </a:r>
             <a:r>
-              <a:rPr lang="fr-FR" dirty="0" err="1" smtClean="0"/>
-              <a:t>ecrire</a:t>
-            </a:r>
-            <a:r>
-              <a:rPr lang="fr-FR" dirty="0" smtClean="0"/>
-              <a:t> des données</a:t>
+              <a:rPr lang="fr-FR" dirty="0"/>
+              <a:t>é</a:t>
+            </a:r>
+            <a:r>
+              <a:rPr lang="fr-FR" dirty="0" smtClean="0"/>
+              <a:t>crire des données</a:t>
             </a:r>
             <a:endParaRPr lang="fr-FR" dirty="0"/>
           </a:p>
@@ -3841,191 +5032,6 @@
 </p:sld>
 </file>
 
-<file path=ppt/slides/slide18.xml><?xml version="1.0" encoding="utf-8"?>
-<p:sld xmlns:a="http://schemas.openxmlformats.org/drawingml/2006/main" xmlns:r="http://schemas.openxmlformats.org/officeDocument/2006/relationships" xmlns:p="http://schemas.openxmlformats.org/presentationml/2006/main">
-  <p:cSld>
-    <p:spTree>
-      <p:nvGrpSpPr>
-        <p:cNvPr id="1" name=""/>
-        <p:cNvGrpSpPr/>
-        <p:nvPr/>
-      </p:nvGrpSpPr>
-      <p:grpSpPr>
-        <a:xfrm>
-          <a:off x="0" y="0"/>
-          <a:ext cx="0" cy="0"/>
-          <a:chOff x="0" y="0"/>
-          <a:chExt cx="0" cy="0"/>
-        </a:xfrm>
-      </p:grpSpPr>
-      <p:sp>
-        <p:nvSpPr>
-          <p:cNvPr id="2" name="Titre 1"/>
-          <p:cNvSpPr>
-            <a:spLocks noGrp="1"/>
-          </p:cNvSpPr>
-          <p:nvPr>
-            <p:ph type="title"/>
-          </p:nvPr>
-        </p:nvSpPr>
-        <p:spPr/>
-        <p:txBody>
-          <a:bodyPr/>
-          <a:lstStyle/>
-          <a:p>
-            <a:r>
-              <a:rPr lang="fr-FR" dirty="0" smtClean="0"/>
-              <a:t>Packages</a:t>
-            </a:r>
-            <a:endParaRPr lang="fr-FR" dirty="0"/>
-          </a:p>
-        </p:txBody>
-      </p:sp>
-      <p:sp>
-        <p:nvSpPr>
-          <p:cNvPr id="3" name="Espace réservé du contenu 2"/>
-          <p:cNvSpPr>
-            <a:spLocks noGrp="1"/>
-          </p:cNvSpPr>
-          <p:nvPr>
-            <p:ph idx="1"/>
-          </p:nvPr>
-        </p:nvSpPr>
-        <p:spPr/>
-        <p:txBody>
-          <a:bodyPr/>
-          <a:lstStyle/>
-          <a:p>
-            <a:r>
-              <a:rPr lang="fr-FR" dirty="0" smtClean="0"/>
-              <a:t>CRAN, </a:t>
-            </a:r>
-            <a:r>
-              <a:rPr lang="fr-FR" dirty="0" err="1" smtClean="0"/>
-              <a:t>BioC</a:t>
-            </a:r>
-            <a:endParaRPr lang="fr-FR" dirty="0" smtClean="0"/>
-          </a:p>
-          <a:p>
-            <a:r>
-              <a:rPr lang="fr-FR" dirty="0" smtClean="0"/>
-              <a:t>Exemples ?</a:t>
-            </a:r>
-          </a:p>
-          <a:p>
-            <a:r>
-              <a:rPr lang="fr-FR" dirty="0" smtClean="0"/>
-              <a:t>Installation / </a:t>
-            </a:r>
-            <a:r>
-              <a:rPr lang="fr-FR" dirty="0" err="1" smtClean="0"/>
-              <a:t>loading</a:t>
-            </a:r>
-            <a:endParaRPr lang="fr-FR" dirty="0" smtClean="0"/>
-          </a:p>
-          <a:p>
-            <a:r>
-              <a:rPr lang="fr-FR" dirty="0" err="1" smtClean="0"/>
-              <a:t>sessionInfos</a:t>
-            </a:r>
-            <a:r>
-              <a:rPr lang="fr-FR" dirty="0" smtClean="0"/>
-              <a:t>()</a:t>
-            </a:r>
-          </a:p>
-          <a:p>
-            <a:endParaRPr lang="fr-FR" dirty="0" smtClean="0"/>
-          </a:p>
-          <a:p>
-            <a:endParaRPr lang="fr-FR" dirty="0"/>
-          </a:p>
-        </p:txBody>
-      </p:sp>
-    </p:spTree>
-    <p:extLst>
-      <p:ext uri="{BB962C8B-B14F-4D97-AF65-F5344CB8AC3E}">
-        <p14:creationId xmlns:p14="http://schemas.microsoft.com/office/powerpoint/2010/main" val="1811433272"/>
-      </p:ext>
-    </p:extLst>
-  </p:cSld>
-  <p:clrMapOvr>
-    <a:masterClrMapping/>
-  </p:clrMapOvr>
-</p:sld>
-</file>
-
-<file path=ppt/slides/slide19.xml><?xml version="1.0" encoding="utf-8"?>
-<p:sld xmlns:a="http://schemas.openxmlformats.org/drawingml/2006/main" xmlns:r="http://schemas.openxmlformats.org/officeDocument/2006/relationships" xmlns:p="http://schemas.openxmlformats.org/presentationml/2006/main">
-  <p:cSld>
-    <p:spTree>
-      <p:nvGrpSpPr>
-        <p:cNvPr id="1" name=""/>
-        <p:cNvGrpSpPr/>
-        <p:nvPr/>
-      </p:nvGrpSpPr>
-      <p:grpSpPr>
-        <a:xfrm>
-          <a:off x="0" y="0"/>
-          <a:ext cx="0" cy="0"/>
-          <a:chOff x="0" y="0"/>
-          <a:chExt cx="0" cy="0"/>
-        </a:xfrm>
-      </p:grpSpPr>
-      <p:sp>
-        <p:nvSpPr>
-          <p:cNvPr id="2" name="Titre 1"/>
-          <p:cNvSpPr>
-            <a:spLocks noGrp="1"/>
-          </p:cNvSpPr>
-          <p:nvPr>
-            <p:ph type="title"/>
-          </p:nvPr>
-        </p:nvSpPr>
-        <p:spPr/>
-        <p:txBody>
-          <a:bodyPr/>
-          <a:lstStyle/>
-          <a:p>
-            <a:r>
-              <a:rPr lang="fr-FR" dirty="0" smtClean="0"/>
-              <a:t>Faire ses propres scripts</a:t>
-            </a:r>
-            <a:endParaRPr lang="fr-FR" dirty="0"/>
-          </a:p>
-        </p:txBody>
-      </p:sp>
-      <p:sp>
-        <p:nvSpPr>
-          <p:cNvPr id="3" name="Espace réservé du contenu 2"/>
-          <p:cNvSpPr>
-            <a:spLocks noGrp="1"/>
-          </p:cNvSpPr>
-          <p:nvPr>
-            <p:ph idx="1"/>
-          </p:nvPr>
-        </p:nvSpPr>
-        <p:spPr/>
-        <p:txBody>
-          <a:bodyPr/>
-          <a:lstStyle/>
-          <a:p>
-            <a:endParaRPr lang="fr-FR" dirty="0"/>
-          </a:p>
-        </p:txBody>
-      </p:sp>
-    </p:spTree>
-    <p:extLst>
-      <p:ext uri="{BB962C8B-B14F-4D97-AF65-F5344CB8AC3E}">
-        <p14:creationId xmlns:p14="http://schemas.microsoft.com/office/powerpoint/2010/main" val="119004942"/>
-      </p:ext>
-    </p:extLst>
-  </p:cSld>
-  <p:clrMapOvr>
-    <a:masterClrMapping/>
-  </p:clrMapOvr>
-</p:sld>
-</file>
-
 <file path=ppt/slides/slide2.xml><?xml version="1.0" encoding="utf-8"?>
 <p:sld xmlns:a="http://schemas.openxmlformats.org/drawingml/2006/main" xmlns:r="http://schemas.openxmlformats.org/officeDocument/2006/relationships" xmlns:p="http://schemas.openxmlformats.org/presentationml/2006/main">
   <p:cSld>
@@ -4060,7 +5066,7 @@
           <a:p>
             <a:r>
               <a:rPr lang="fr-FR" dirty="0" smtClean="0"/>
-              <a:t>Présentation de R</a:t>
+              <a:t>Présentation de</a:t>
             </a:r>
             <a:endParaRPr lang="fr-FR" dirty="0"/>
           </a:p>
@@ -4068,34 +5074,266 @@
       </p:sp>
       <p:sp>
         <p:nvSpPr>
-          <p:cNvPr id="3" name="Espace réservé du contenu 2"/>
-          <p:cNvSpPr>
-            <a:spLocks noGrp="1"/>
-          </p:cNvSpPr>
-          <p:nvPr>
-            <p:ph idx="1"/>
-          </p:nvPr>
-        </p:nvSpPr>
-        <p:spPr/>
-        <p:txBody>
-          <a:bodyPr/>
-          <a:lstStyle/>
-          <a:p>
-            <a:r>
-              <a:rPr lang="fr-FR" dirty="0" smtClean="0"/>
-              <a:t>Définition </a:t>
-            </a:r>
-            <a:r>
-              <a:rPr lang="fr-FR" dirty="0" err="1" smtClean="0"/>
-              <a:t>blabalbalbla</a:t>
-            </a:r>
+          <p:cNvPr id="4" name="Rectangle 3"/>
+          <p:cNvSpPr/>
+          <p:nvPr/>
+        </p:nvSpPr>
+        <p:spPr>
+          <a:xfrm>
+            <a:off x="849924" y="2021955"/>
+            <a:ext cx="7729415" cy="3693319"/>
+          </a:xfrm>
+          <a:prstGeom prst="rect">
+            <a:avLst/>
+          </a:prstGeom>
+          <a:ln>
+            <a:solidFill>
+              <a:schemeClr val="tx1"/>
+            </a:solidFill>
+          </a:ln>
+        </p:spPr>
+        <p:txBody>
+          <a:bodyPr wrap="square">
+            <a:spAutoFit/>
+          </a:bodyPr>
+          <a:lstStyle/>
+          <a:p>
+            <a:r>
+              <a:rPr lang="fr-FR" dirty="0"/>
+              <a:t>R est à la fois un logiciel de statistique et un langage de </a:t>
+            </a:r>
+            <a:r>
+              <a:rPr lang="fr-FR" dirty="0" smtClean="0"/>
+              <a:t>programmation : </a:t>
+            </a:r>
+          </a:p>
+          <a:p>
             <a:endParaRPr lang="fr-FR" dirty="0" smtClean="0"/>
           </a:p>
           <a:p>
+            <a:r>
+              <a:rPr lang="fr-FR" b="1" dirty="0"/>
+              <a:t>R est un langage de programmation </a:t>
+            </a:r>
+            <a:r>
+              <a:rPr lang="fr-FR" b="1" dirty="0" smtClean="0"/>
+              <a:t>(</a:t>
+            </a:r>
+            <a:r>
+              <a:rPr lang="fr-FR" b="1" dirty="0" err="1" smtClean="0"/>
+              <a:t>scripting</a:t>
+            </a:r>
+            <a:r>
+              <a:rPr lang="fr-FR" b="1" dirty="0" smtClean="0"/>
+              <a:t>) </a:t>
+            </a:r>
+            <a:r>
+              <a:rPr lang="fr-FR" b="1" dirty="0"/>
+              <a:t>interprété</a:t>
+            </a:r>
+            <a:r>
+              <a:rPr lang="fr-FR" dirty="0"/>
+              <a:t> </a:t>
+            </a:r>
+            <a:r>
+              <a:rPr lang="fr-FR" dirty="0" smtClean="0"/>
+              <a:t>et dérivé </a:t>
+            </a:r>
+            <a:r>
+              <a:rPr lang="fr-FR" dirty="0"/>
+              <a:t>de </a:t>
+            </a:r>
+            <a:r>
+              <a:rPr lang="fr-FR" dirty="0" smtClean="0"/>
+              <a:t>S:</a:t>
+            </a:r>
+          </a:p>
+          <a:p>
+            <a:pPr marL="285750" indent="-285750">
+              <a:buFontTx/>
+              <a:buChar char="-"/>
+            </a:pPr>
+            <a:r>
+              <a:rPr lang="fr-FR" dirty="0" smtClean="0"/>
+              <a:t>données </a:t>
+            </a:r>
+            <a:r>
+              <a:rPr lang="fr-FR" dirty="0"/>
+              <a:t>simples et </a:t>
+            </a:r>
+            <a:r>
+              <a:rPr lang="fr-FR" dirty="0" smtClean="0"/>
+              <a:t>structurées</a:t>
+            </a:r>
             <a:endParaRPr lang="fr-FR" dirty="0"/>
           </a:p>
-        </p:txBody>
-      </p:sp>
+          <a:p>
+            <a:pPr marL="285750" indent="-285750">
+              <a:buFontTx/>
+              <a:buChar char="-"/>
+            </a:pPr>
+            <a:r>
+              <a:rPr lang="fr-FR" dirty="0" smtClean="0"/>
+              <a:t>opération </a:t>
+            </a:r>
+            <a:r>
+              <a:rPr lang="fr-FR" dirty="0"/>
+              <a:t>d'entrée-sortie, branchements conditionnels, boucles indicées et conditionnelles, récursivité, etc. </a:t>
+            </a:r>
+            <a:endParaRPr lang="fr-FR" dirty="0" smtClean="0"/>
+          </a:p>
+          <a:p>
+            <a:pPr marL="285750" indent="-285750">
+              <a:buFontTx/>
+              <a:buChar char="-"/>
+            </a:pPr>
+            <a:endParaRPr lang="fr-FR" dirty="0"/>
+          </a:p>
+          <a:p>
+            <a:r>
+              <a:rPr lang="fr-FR" b="1" dirty="0"/>
+              <a:t>R est un logiciel de traitement statistique des </a:t>
+            </a:r>
+            <a:r>
+              <a:rPr lang="fr-FR" b="1" dirty="0" smtClean="0"/>
+              <a:t>données, il dispose</a:t>
+            </a:r>
+            <a:r>
+              <a:rPr lang="fr-FR" dirty="0" smtClean="0"/>
+              <a:t> : </a:t>
+            </a:r>
+          </a:p>
+          <a:p>
+            <a:pPr marL="285750" indent="-285750">
+              <a:buFontTx/>
+              <a:buChar char="-"/>
+            </a:pPr>
+            <a:r>
+              <a:rPr lang="fr-FR" dirty="0" smtClean="0"/>
+              <a:t>interpréteur </a:t>
+            </a:r>
+            <a:r>
+              <a:rPr lang="fr-FR" dirty="0"/>
+              <a:t>de </a:t>
+            </a:r>
+            <a:r>
+              <a:rPr lang="fr-FR" dirty="0" smtClean="0"/>
+              <a:t>commandes</a:t>
+            </a:r>
+          </a:p>
+          <a:p>
+            <a:pPr marL="285750" indent="-285750">
+              <a:buFontTx/>
+              <a:buChar char="-"/>
+            </a:pPr>
+            <a:r>
+              <a:rPr lang="fr-FR" dirty="0" smtClean="0"/>
+              <a:t>bibliothèque </a:t>
+            </a:r>
+            <a:r>
+              <a:rPr lang="fr-FR" dirty="0"/>
+              <a:t>très large de fonctions </a:t>
+            </a:r>
+            <a:r>
+              <a:rPr lang="fr-FR" dirty="0" smtClean="0"/>
+              <a:t>statistiques, de </a:t>
+            </a:r>
+            <a:r>
+              <a:rPr lang="fr-FR" dirty="0"/>
+              <a:t>"packages", </a:t>
+            </a:r>
+            <a:r>
+              <a:rPr lang="fr-FR" dirty="0" smtClean="0"/>
+              <a:t>de </a:t>
+            </a:r>
+            <a:r>
+              <a:rPr lang="fr-FR" dirty="0"/>
+              <a:t>modules externes </a:t>
+            </a:r>
+            <a:r>
+              <a:rPr lang="fr-FR" dirty="0" smtClean="0"/>
+              <a:t>compilés téléchargeable </a:t>
+            </a:r>
+            <a:r>
+              <a:rPr lang="fr-FR" dirty="0"/>
+              <a:t>gratuitement sur </a:t>
+            </a:r>
+            <a:r>
+              <a:rPr lang="fr-FR" dirty="0" smtClean="0"/>
+              <a:t>internet</a:t>
+            </a:r>
+          </a:p>
+          <a:p>
+            <a:pPr marL="285750" indent="-285750">
+              <a:buFontTx/>
+              <a:buChar char="-"/>
+            </a:pPr>
+            <a:r>
+              <a:rPr lang="fr-FR" dirty="0" smtClean="0"/>
+              <a:t>palette </a:t>
+            </a:r>
+            <a:r>
+              <a:rPr lang="fr-FR" dirty="0"/>
+              <a:t>étendue de fonctionnalités </a:t>
+            </a:r>
+            <a:r>
+              <a:rPr lang="fr-FR" dirty="0" smtClean="0"/>
+              <a:t>graphiques</a:t>
+            </a:r>
+          </a:p>
+          <a:p>
+            <a:pPr marL="285750" indent="-285750">
+              <a:buFontTx/>
+              <a:buChar char="-"/>
+            </a:pPr>
+            <a:r>
+              <a:rPr lang="fr-FR" dirty="0" smtClean="0"/>
+              <a:t>Il </a:t>
+            </a:r>
+            <a:r>
+              <a:rPr lang="fr-FR" dirty="0"/>
+              <a:t>est possible d'utiliser R en mode </a:t>
+            </a:r>
+            <a:r>
+              <a:rPr lang="fr-FR" dirty="0" smtClean="0"/>
+              <a:t>interactif </a:t>
+            </a:r>
+            <a:r>
+              <a:rPr lang="fr-FR" dirty="0"/>
+              <a:t>sans jamais avoir à programmer</a:t>
+            </a:r>
+            <a:r>
+              <a:rPr lang="fr-FR" dirty="0" smtClean="0"/>
+              <a:t>.</a:t>
+            </a:r>
+            <a:endParaRPr lang="fr-FR" dirty="0"/>
+          </a:p>
+        </p:txBody>
+      </p:sp>
+      <p:pic>
+        <p:nvPicPr>
+          <p:cNvPr id="5" name="Image 4"/>
+          <p:cNvPicPr>
+            <a:picLocks noChangeAspect="1"/>
+          </p:cNvPicPr>
+          <p:nvPr/>
+        </p:nvPicPr>
+        <p:blipFill>
+          <a:blip r:embed="rId2"/>
+          <a:stretch>
+            <a:fillRect/>
+          </a:stretch>
+        </p:blipFill>
+        <p:spPr>
+          <a:xfrm>
+            <a:off x="6476024" y="274638"/>
+            <a:ext cx="1663700" cy="1295400"/>
+          </a:xfrm>
+          <a:prstGeom prst="rect">
+            <a:avLst/>
+          </a:prstGeom>
+        </p:spPr>
+      </p:pic>
     </p:spTree>
     <p:extLst>
       <p:ext uri="{BB962C8B-B14F-4D97-AF65-F5344CB8AC3E}">
@@ -4126,9 +5364,39 @@
           <a:chExt cx="0" cy="0"/>
         </a:xfrm>
       </p:grpSpPr>
-      <p:sp>
-        <p:nvSpPr>
-          <p:cNvPr id="2" name="Titre 1"/>
+      <p:pic>
+        <p:nvPicPr>
+          <p:cNvPr id="4" name="Image 3" descr="Capture d’écran 2016-10-17 à 21.03.54.png"/>
+          <p:cNvPicPr>
+            <a:picLocks noChangeAspect="1"/>
+          </p:cNvPicPr>
+          <p:nvPr/>
+        </p:nvPicPr>
+        <p:blipFill>
+          <a:blip r:embed="rId2">
+            <a:extLst>
+              <a:ext uri="{28A0092B-C50C-407E-A947-70E740481C1C}">
+                <a14:useLocalDpi xmlns:a14="http://schemas.microsoft.com/office/drawing/2010/main" val="0"/>
+              </a:ext>
+            </a:extLst>
+          </a:blip>
+          <a:stretch>
+            <a:fillRect/>
+          </a:stretch>
+        </p:blipFill>
+        <p:spPr>
+          <a:xfrm>
+            <a:off x="0" y="1225368"/>
+            <a:ext cx="9144000" cy="5632632"/>
+          </a:xfrm>
+          <a:prstGeom prst="rect">
+            <a:avLst/>
+          </a:prstGeom>
+        </p:spPr>
+      </p:pic>
+      <p:sp>
+        <p:nvSpPr>
+          <p:cNvPr id="5" name="Titre 1"/>
           <p:cNvSpPr>
             <a:spLocks noGrp="1"/>
           </p:cNvSpPr>
@@ -4136,241 +5404,24 @@
             <p:ph type="title"/>
           </p:nvPr>
         </p:nvSpPr>
-        <p:spPr/>
-        <p:txBody>
-          <a:bodyPr/>
-          <a:lstStyle/>
-          <a:p>
-            <a:r>
-              <a:rPr lang="fr-FR" dirty="0" smtClean="0"/>
-              <a:t>Ressources, aide</a:t>
-            </a:r>
-            <a:endParaRPr lang="fr-FR" dirty="0"/>
-          </a:p>
-        </p:txBody>
-      </p:sp>
-      <p:sp>
-        <p:nvSpPr>
-          <p:cNvPr id="3" name="Espace réservé du contenu 2"/>
-          <p:cNvSpPr>
-            <a:spLocks noGrp="1"/>
-          </p:cNvSpPr>
-          <p:nvPr>
-            <p:ph idx="1"/>
-          </p:nvPr>
-        </p:nvSpPr>
-        <p:spPr/>
-        <p:txBody>
-          <a:bodyPr>
-            <a:normAutofit fontScale="55000" lnSpcReduction="20000"/>
-          </a:bodyPr>
-          <a:lstStyle/>
-          <a:p>
-            <a:r>
-              <a:rPr lang="fr-FR" dirty="0" smtClean="0"/>
-              <a:t>Help, ?</a:t>
-            </a:r>
-          </a:p>
-          <a:p>
-            <a:endParaRPr lang="fr-FR" dirty="0" smtClean="0"/>
-          </a:p>
-          <a:p>
-            <a:r>
-              <a:rPr lang="fr-FR" dirty="0" smtClean="0"/>
-              <a:t>  R | Signification | Exemples</a:t>
-            </a:r>
-          </a:p>
-          <a:p>
-            <a:r>
-              <a:rPr lang="fr-FR" dirty="0" smtClean="0"/>
-              <a:t>--- | ------------- | -------</a:t>
-            </a:r>
-          </a:p>
-          <a:p>
-            <a:r>
-              <a:rPr lang="fr-FR" dirty="0" smtClean="0"/>
-              <a:t>`?` | Aide rapide   | `?</a:t>
+        <p:spPr>
+          <a:xfrm>
+            <a:off x="457200" y="274638"/>
+            <a:ext cx="8229600" cy="1143000"/>
+          </a:xfrm>
+        </p:spPr>
+        <p:txBody>
+          <a:bodyPr/>
+          <a:lstStyle/>
+          <a:p>
+            <a:r>
+              <a:rPr lang="fr-FR" dirty="0" smtClean="0"/>
+              <a:t>Utilisation avec un </a:t>
             </a:r>
             <a:r>
               <a:rPr lang="fr-FR" dirty="0" err="1" smtClean="0"/>
-              <a:t>mean</a:t>
-            </a:r>
-            <a:r>
-              <a:rPr lang="fr-FR" dirty="0" smtClean="0"/>
-              <a:t>` ou `?"</a:t>
-            </a:r>
-            <a:r>
-              <a:rPr lang="fr-FR" dirty="0" err="1" smtClean="0"/>
-              <a:t>mean</a:t>
-            </a:r>
-            <a:r>
-              <a:rPr lang="fr-FR" dirty="0" smtClean="0"/>
-              <a:t>"` mais pas `?</a:t>
-            </a:r>
-            <a:r>
-              <a:rPr lang="fr-FR" dirty="0" err="1" smtClean="0"/>
-              <a:t>t</a:t>
-            </a:r>
-            <a:r>
-              <a:rPr lang="fr-FR" dirty="0" smtClean="0"/>
-              <a:t>-test`</a:t>
-            </a:r>
-          </a:p>
-          <a:p>
-            <a:r>
-              <a:rPr lang="fr-FR" dirty="0" smtClean="0"/>
-              <a:t>`help` | Version plus complète de `?` | `help("</a:t>
-            </a:r>
-            <a:r>
-              <a:rPr lang="fr-FR" dirty="0" err="1" smtClean="0"/>
-              <a:t>mean</a:t>
-            </a:r>
-            <a:r>
-              <a:rPr lang="fr-FR" dirty="0" smtClean="0"/>
-              <a:t>")` mais pas `help("</a:t>
-            </a:r>
-            <a:r>
-              <a:rPr lang="fr-FR" dirty="0" err="1" smtClean="0"/>
-              <a:t>t</a:t>
-            </a:r>
-            <a:r>
-              <a:rPr lang="fr-FR" dirty="0" smtClean="0"/>
-              <a:t>-test")`</a:t>
-            </a:r>
-          </a:p>
-          <a:p>
-            <a:r>
-              <a:rPr lang="fr-FR" dirty="0" smtClean="0"/>
-              <a:t>`??` | Aide rapide  sur un sujet | `??variance` ou `??"variance"`</a:t>
-            </a:r>
-          </a:p>
-          <a:p>
-            <a:r>
-              <a:rPr lang="fr-FR" dirty="0" smtClean="0"/>
-              <a:t>`</a:t>
-            </a:r>
-            <a:r>
-              <a:rPr lang="fr-FR" dirty="0" err="1" smtClean="0"/>
-              <a:t>help.search</a:t>
-            </a:r>
-            <a:r>
-              <a:rPr lang="fr-FR" dirty="0" smtClean="0"/>
-              <a:t>` | Version plus complète de `??` | `</a:t>
-            </a:r>
-            <a:r>
-              <a:rPr lang="fr-FR" dirty="0" err="1" smtClean="0"/>
-              <a:t>help.search</a:t>
-            </a:r>
-            <a:r>
-              <a:rPr lang="fr-FR" dirty="0" smtClean="0"/>
-              <a:t>("</a:t>
-            </a:r>
-            <a:r>
-              <a:rPr lang="fr-FR" dirty="0" err="1" smtClean="0"/>
-              <a:t>t</a:t>
-            </a:r>
-            <a:r>
-              <a:rPr lang="fr-FR" dirty="0" smtClean="0"/>
-              <a:t>-test")` mais pas `help("</a:t>
-            </a:r>
-            <a:r>
-              <a:rPr lang="fr-FR" dirty="0" err="1" smtClean="0"/>
-              <a:t>t</a:t>
-            </a:r>
-            <a:r>
-              <a:rPr lang="fr-FR" dirty="0" smtClean="0"/>
-              <a:t>-test")`</a:t>
-            </a:r>
-          </a:p>
-          <a:p>
-            <a:r>
-              <a:rPr lang="fr-FR" dirty="0" smtClean="0"/>
-              <a:t>`</a:t>
-            </a:r>
-            <a:r>
-              <a:rPr lang="fr-FR" dirty="0" err="1" smtClean="0"/>
-              <a:t>RSiteSearch</a:t>
-            </a:r>
-            <a:r>
-              <a:rPr lang="fr-FR" dirty="0" smtClean="0"/>
-              <a:t>` | Aide en ligne | `</a:t>
-            </a:r>
-            <a:r>
-              <a:rPr lang="fr-FR" dirty="0" err="1" smtClean="0"/>
-              <a:t>RSiteSearch</a:t>
-            </a:r>
-            <a:r>
-              <a:rPr lang="fr-FR" dirty="0" smtClean="0"/>
-              <a:t>("</a:t>
-            </a:r>
-            <a:r>
-              <a:rPr lang="fr-FR" dirty="0" err="1" smtClean="0"/>
-              <a:t>Fleiss</a:t>
-            </a:r>
-            <a:r>
-              <a:rPr lang="fr-FR" dirty="0" smtClean="0"/>
-              <a:t>' kappa")`</a:t>
-            </a:r>
-          </a:p>
-          <a:p>
-            <a:endParaRPr lang="fr-FR" dirty="0"/>
-          </a:p>
-          <a:p>
-            <a:r>
-              <a:rPr lang="fr-FR" dirty="0"/>
-              <a:t>Programmation R </a:t>
-            </a:r>
-            <a:endParaRPr lang="fr-FR" dirty="0" smtClean="0">
-              <a:effectLst/>
-            </a:endParaRPr>
-          </a:p>
-          <a:p>
-            <a:r>
-              <a:rPr lang="fr-FR" dirty="0"/>
-              <a:t>http://</a:t>
-            </a:r>
-            <a:r>
-              <a:rPr lang="fr-FR" dirty="0" err="1"/>
-              <a:t>www.duclert.org</a:t>
-            </a:r>
-            <a:r>
-              <a:rPr lang="fr-FR" dirty="0"/>
-              <a:t>/ </a:t>
-            </a:r>
-            <a:endParaRPr lang="fr-FR" dirty="0" smtClean="0">
-              <a:effectLst/>
-            </a:endParaRPr>
-          </a:p>
-          <a:p>
-            <a:r>
-              <a:rPr lang="fr-FR" dirty="0"/>
-              <a:t>Quick-R </a:t>
-            </a:r>
-            <a:endParaRPr lang="fr-FR" dirty="0" smtClean="0">
-              <a:effectLst/>
-            </a:endParaRPr>
-          </a:p>
-          <a:p>
-            <a:r>
-              <a:rPr lang="fr-FR" dirty="0"/>
-              <a:t>http://</a:t>
-            </a:r>
-            <a:r>
-              <a:rPr lang="fr-FR" dirty="0" err="1"/>
-              <a:t>www.statmethods.net</a:t>
-            </a:r>
-            <a:r>
-              <a:rPr lang="fr-FR" dirty="0"/>
-              <a:t>/ </a:t>
-            </a:r>
-            <a:endParaRPr lang="fr-FR" dirty="0" smtClean="0">
-              <a:effectLst/>
-            </a:endParaRPr>
-          </a:p>
-          <a:p>
-            <a:endParaRPr lang="fr-FR" dirty="0" smtClean="0"/>
-          </a:p>
-          <a:p>
+              <a:t>teRminal</a:t>
+            </a:r>
             <a:endParaRPr lang="fr-FR" dirty="0" smtClean="0"/>
           </a:p>
         </p:txBody>
@@ -4378,7 +5429,7 @@
     </p:spTree>
     <p:extLst>
       <p:ext uri="{BB962C8B-B14F-4D97-AF65-F5344CB8AC3E}">
-        <p14:creationId xmlns:p14="http://schemas.microsoft.com/office/powerpoint/2010/main" val="3864167245"/>
+        <p14:creationId xmlns:p14="http://schemas.microsoft.com/office/powerpoint/2010/main" val="2701534490"/>
       </p:ext>
     </p:extLst>
   </p:cSld>
@@ -4405,32 +5456,9 @@
           <a:chExt cx="0" cy="0"/>
         </a:xfrm>
       </p:grpSpPr>
-      <p:sp>
-        <p:nvSpPr>
-          <p:cNvPr id="2" name="Titre 1"/>
-          <p:cNvSpPr>
-            <a:spLocks noGrp="1"/>
-          </p:cNvSpPr>
-          <p:nvPr>
-            <p:ph type="title"/>
-          </p:nvPr>
-        </p:nvSpPr>
-        <p:spPr/>
-        <p:txBody>
-          <a:bodyPr/>
-          <a:lstStyle/>
-          <a:p>
-            <a:r>
-              <a:rPr lang="fr-FR" dirty="0" smtClean="0"/>
-              <a:t>Commandes de Bases</a:t>
-            </a:r>
-            <a:endParaRPr lang="fr-FR" dirty="0"/>
-          </a:p>
-        </p:txBody>
-      </p:sp>
       <p:pic>
         <p:nvPicPr>
-          <p:cNvPr id="5" name="Image 4" descr="Capture d’écran 2016-10-10 à 21.25.11.png"/>
+          <p:cNvPr id="2" name="Image 1" descr="Capture d’écran 2016-10-17 à 21.05.34.png"/>
           <p:cNvPicPr>
             <a:picLocks noChangeAspect="1"/>
           </p:cNvPicPr>
@@ -4450,18 +5478,41 @@
         </p:blipFill>
         <p:spPr>
           <a:xfrm>
-            <a:off x="818662" y="1417638"/>
-            <a:ext cx="6897077" cy="5034611"/>
+            <a:off x="547076" y="1417638"/>
+            <a:ext cx="7756769" cy="5780204"/>
           </a:xfrm>
           <a:prstGeom prst="rect">
             <a:avLst/>
           </a:prstGeom>
         </p:spPr>
       </p:pic>
+      <p:sp>
+        <p:nvSpPr>
+          <p:cNvPr id="3" name="Titre 2"/>
+          <p:cNvSpPr>
+            <a:spLocks noGrp="1"/>
+          </p:cNvSpPr>
+          <p:nvPr>
+            <p:ph type="title"/>
+          </p:nvPr>
+        </p:nvSpPr>
+        <p:spPr/>
+        <p:txBody>
+          <a:bodyPr/>
+          <a:lstStyle/>
+          <a:p>
+            <a:r>
+              <a:rPr lang="fr-FR" dirty="0" smtClean="0"/>
+              <a:t>Utilisation avec une GUI</a:t>
+            </a:r>
+            <a:endParaRPr lang="fr-FR" dirty="0"/>
+          </a:p>
+        </p:txBody>
+      </p:sp>
     </p:spTree>
     <p:extLst>
       <p:ext uri="{BB962C8B-B14F-4D97-AF65-F5344CB8AC3E}">
-        <p14:creationId xmlns:p14="http://schemas.microsoft.com/office/powerpoint/2010/main" val="1676878831"/>
+        <p14:creationId xmlns:p14="http://schemas.microsoft.com/office/powerpoint/2010/main" val="3664632964"/>
       </p:ext>
     </p:extLst>
   </p:cSld>
@@ -4490,7 +5541,7 @@
       </p:grpSpPr>
       <p:sp>
         <p:nvSpPr>
-          <p:cNvPr id="2" name="Titre 1"/>
+          <p:cNvPr id="5" name="Titre 1"/>
           <p:cNvSpPr>
             <a:spLocks noGrp="1"/>
           </p:cNvSpPr>
@@ -4498,104 +5549,133 @@
             <p:ph type="title"/>
           </p:nvPr>
         </p:nvSpPr>
-        <p:spPr/>
-        <p:txBody>
-          <a:bodyPr/>
-          <a:lstStyle/>
-          <a:p>
-            <a:r>
-              <a:rPr lang="fr-FR" dirty="0" smtClean="0"/>
-              <a:t>Syntaxe</a:t>
+        <p:spPr>
+          <a:xfrm>
+            <a:off x="457200" y="274638"/>
+            <a:ext cx="8229600" cy="1143000"/>
+          </a:xfrm>
+        </p:spPr>
+        <p:txBody>
+          <a:bodyPr>
+            <a:normAutofit fontScale="90000"/>
+          </a:bodyPr>
+          <a:lstStyle/>
+          <a:p>
+            <a:r>
+              <a:rPr lang="fr-FR" dirty="0" smtClean="0"/>
+              <a:t>Un outil aux </a:t>
+            </a:r>
+            <a:r>
+              <a:rPr lang="fr-FR" dirty="0" err="1" smtClean="0"/>
+              <a:t>fonctionnalitées</a:t>
+            </a:r>
+            <a:r>
+              <a:rPr lang="fr-FR" dirty="0" smtClean="0"/>
+              <a:t> </a:t>
+            </a:r>
+            <a:r>
+              <a:rPr lang="fr-FR" dirty="0" smtClean="0"/>
+              <a:t>avancées</a:t>
             </a:r>
             <a:endParaRPr lang="fr-FR" dirty="0"/>
           </a:p>
         </p:txBody>
       </p:sp>
-      <p:sp>
-        <p:nvSpPr>
-          <p:cNvPr id="3" name="Espace réservé du contenu 2"/>
-          <p:cNvSpPr>
-            <a:spLocks noGrp="1"/>
-          </p:cNvSpPr>
-          <p:nvPr>
-            <p:ph idx="1"/>
-          </p:nvPr>
-        </p:nvSpPr>
-        <p:spPr/>
-        <p:txBody>
-          <a:bodyPr>
-            <a:normAutofit fontScale="70000" lnSpcReduction="20000"/>
+      <p:pic>
+        <p:nvPicPr>
+          <p:cNvPr id="3" name="Image 2"/>
+          <p:cNvPicPr>
+            <a:picLocks noChangeAspect="1"/>
+          </p:cNvPicPr>
+          <p:nvPr/>
+        </p:nvPicPr>
+        <p:blipFill>
+          <a:blip r:embed="rId2"/>
+          <a:stretch>
+            <a:fillRect/>
+          </a:stretch>
+        </p:blipFill>
+        <p:spPr>
+          <a:xfrm>
+            <a:off x="520003" y="1417638"/>
+            <a:ext cx="1587500" cy="558800"/>
+          </a:xfrm>
+          <a:prstGeom prst="rect">
+            <a:avLst/>
+          </a:prstGeom>
+        </p:spPr>
+      </p:pic>
+      <p:sp>
+        <p:nvSpPr>
+          <p:cNvPr id="4" name="Rectangle 3"/>
+          <p:cNvSpPr/>
+          <p:nvPr/>
+        </p:nvSpPr>
+        <p:spPr>
+          <a:xfrm>
+            <a:off x="2302766" y="1489346"/>
+            <a:ext cx="2584624" cy="369332"/>
+          </a:xfrm>
+          <a:prstGeom prst="rect">
+            <a:avLst/>
+          </a:prstGeom>
+        </p:spPr>
+        <p:txBody>
+          <a:bodyPr wrap="none">
+            <a:spAutoFit/>
           </a:bodyPr>
           <a:lstStyle/>
           <a:p>
-            <a:endParaRPr lang="fr-FR" dirty="0" smtClean="0"/>
-          </a:p>
-          <a:p>
-            <a:r>
-              <a:rPr lang="fr-FR" dirty="0" smtClean="0"/>
-              <a:t>Certains espaces sont importants...</a:t>
-            </a:r>
-          </a:p>
-          <a:p>
-            <a:endParaRPr lang="fr-FR" dirty="0" smtClean="0"/>
-          </a:p>
-          <a:p>
-            <a:r>
-              <a:rPr lang="fr-FR" dirty="0" smtClean="0"/>
-              <a:t>&gt; - `x &lt;- 1` : la variable `x` contient la valeur 1.</a:t>
-            </a:r>
-          </a:p>
-          <a:p>
-            <a:r>
-              <a:rPr lang="fr-FR" dirty="0" smtClean="0"/>
-              <a:t>&gt; - `x &lt; -1` : est-ce que la valeur prise par la variable `x` est plus petite que -1 ?</a:t>
-            </a:r>
-          </a:p>
-          <a:p>
-            <a:r>
-              <a:rPr lang="fr-FR" dirty="0" smtClean="0"/>
-              <a:t>&gt; - `x &lt;- -1` : la variable `x` contient la valeur -1.</a:t>
-            </a:r>
-          </a:p>
-          <a:p>
-            <a:r>
-              <a:rPr lang="fr-FR" dirty="0" smtClean="0"/>
-              <a:t>&gt; - `y &lt;- 1:10` : la variable `y` contient les entiers de 1 à 10.</a:t>
-            </a:r>
-          </a:p>
-          <a:p>
-            <a:endParaRPr lang="fr-FR" dirty="0" smtClean="0"/>
-          </a:p>
-          <a:p>
-            <a:r>
-              <a:rPr lang="fr-FR" dirty="0" smtClean="0"/>
-              <a:t>D'autres servent à la lisibilité...</a:t>
-            </a:r>
-          </a:p>
-          <a:p>
-            <a:endParaRPr lang="fr-FR" dirty="0" smtClean="0"/>
-          </a:p>
-          <a:p>
-            <a:r>
-              <a:rPr lang="fr-FR" dirty="0" smtClean="0"/>
-              <a:t>&gt; - `x &lt;- 1` est équivalent à `x&lt;-1`.</a:t>
-            </a:r>
-          </a:p>
-          <a:p>
-            <a:r>
-              <a:rPr lang="fr-FR" dirty="0" smtClean="0"/>
-              <a:t>&gt; - `x &lt;- -1` est équivalent à `x&lt;--1`.</a:t>
-            </a:r>
-          </a:p>
-          <a:p>
+            <a:r>
+              <a:rPr lang="fr-FR" dirty="0" err="1"/>
+              <a:t>https</a:t>
+            </a:r>
+            <a:r>
+              <a:rPr lang="fr-FR" dirty="0"/>
+              <a:t>://</a:t>
+            </a:r>
+            <a:r>
+              <a:rPr lang="fr-FR" dirty="0" err="1"/>
+              <a:t>www.rstudio.com</a:t>
+            </a:r>
             <a:endParaRPr lang="fr-FR" dirty="0"/>
           </a:p>
         </p:txBody>
       </p:sp>
+      <p:pic>
+        <p:nvPicPr>
+          <p:cNvPr id="7" name="Image 6" descr="Capture d’écran 2016-10-17 à 21.09.10.png"/>
+          <p:cNvPicPr>
+            <a:picLocks noChangeAspect="1"/>
+          </p:cNvPicPr>
+          <p:nvPr/>
+        </p:nvPicPr>
+        <p:blipFill>
+          <a:blip r:embed="rId3">
+            <a:extLst>
+              <a:ext uri="{28A0092B-C50C-407E-A947-70E740481C1C}">
+                <a14:useLocalDpi xmlns:a14="http://schemas.microsoft.com/office/drawing/2010/main" val="0"/>
+              </a:ext>
+            </a:extLst>
+          </a:blip>
+          <a:stretch>
+            <a:fillRect/>
+          </a:stretch>
+        </p:blipFill>
+        <p:spPr>
+          <a:xfrm>
+            <a:off x="785726" y="1920875"/>
+            <a:ext cx="7625582" cy="5154695"/>
+          </a:xfrm>
+          <a:prstGeom prst="rect">
+            <a:avLst/>
+          </a:prstGeom>
+        </p:spPr>
+      </p:pic>
     </p:spTree>
     <p:extLst>
       <p:ext uri="{BB962C8B-B14F-4D97-AF65-F5344CB8AC3E}">
-        <p14:creationId xmlns:p14="http://schemas.microsoft.com/office/powerpoint/2010/main" val="51894442"/>
+        <p14:creationId xmlns:p14="http://schemas.microsoft.com/office/powerpoint/2010/main" val="921988974"/>
       </p:ext>
     </p:extLst>
   </p:cSld>
@@ -4639,7 +5719,7 @@
           <a:p>
             <a:r>
               <a:rPr lang="fr-FR" dirty="0" smtClean="0"/>
-              <a:t>Type et classes</a:t>
+              <a:t>Syntaxe de Base</a:t>
             </a:r>
             <a:endParaRPr lang="fr-FR" dirty="0"/>
           </a:p>
@@ -4647,13 +5727,13 @@
       </p:sp>
       <p:pic>
         <p:nvPicPr>
-          <p:cNvPr id="7" name="Image 6" descr="Capture d’écran 2016-10-10 à 21.29.37.png"/>
+          <p:cNvPr id="5" name="Image 4" descr="Capture d’écran 2016-10-10 à 21.25.11.png"/>
           <p:cNvPicPr>
             <a:picLocks noChangeAspect="1"/>
           </p:cNvPicPr>
           <p:nvPr/>
         </p:nvPicPr>
-        <p:blipFill>
+        <p:blipFill rotWithShape="1">
           <a:blip r:embed="rId2">
             <a:extLst>
               <a:ext uri="{28A0092B-C50C-407E-A947-70E740481C1C}">
@@ -4661,14 +5741,13 @@
               </a:ext>
             </a:extLst>
           </a:blip>
-          <a:stretch>
-            <a:fillRect/>
-          </a:stretch>
+          <a:srcRect t="15307"/>
+          <a:stretch/>
         </p:blipFill>
         <p:spPr>
           <a:xfrm>
-            <a:off x="1152769" y="1564741"/>
-            <a:ext cx="6824394" cy="5176028"/>
+            <a:off x="106400" y="1368792"/>
+            <a:ext cx="8773829" cy="5424195"/>
           </a:xfrm>
           <a:prstGeom prst="rect">
             <a:avLst/>
@@ -4678,7 +5757,7 @@
     </p:spTree>
     <p:extLst>
       <p:ext uri="{BB962C8B-B14F-4D97-AF65-F5344CB8AC3E}">
-        <p14:creationId xmlns:p14="http://schemas.microsoft.com/office/powerpoint/2010/main" val="1619412875"/>
+        <p14:creationId xmlns:p14="http://schemas.microsoft.com/office/powerpoint/2010/main" val="1676878831"/>
       </p:ext>
     </p:extLst>
   </p:cSld>
@@ -4722,7 +5801,7 @@
           <a:p>
             <a:r>
               <a:rPr lang="fr-FR" dirty="0" smtClean="0"/>
-              <a:t>Vecteur</a:t>
+              <a:t>Syntaxe de Base</a:t>
             </a:r>
             <a:endParaRPr lang="fr-FR" dirty="0"/>
           </a:p>
@@ -4738,19 +5817,125 @@
             <p:ph idx="1"/>
           </p:nvPr>
         </p:nvSpPr>
-        <p:spPr/>
-        <p:txBody>
-          <a:bodyPr/>
-          <a:lstStyle/>
-          <a:p>
-            <a:endParaRPr lang="fr-FR"/>
+        <p:spPr>
+          <a:xfrm>
+            <a:off x="310665" y="1600200"/>
+            <a:ext cx="8559800" cy="4349262"/>
+          </a:xfrm>
+        </p:spPr>
+        <p:txBody>
+          <a:bodyPr>
+            <a:normAutofit fontScale="92500" lnSpcReduction="10000"/>
+          </a:bodyPr>
+          <a:lstStyle/>
+          <a:p>
+            <a:r>
+              <a:rPr lang="fr-FR" dirty="0" smtClean="0"/>
+              <a:t>Espace :</a:t>
+            </a:r>
+          </a:p>
+          <a:p>
+            <a:pPr lvl="1"/>
+            <a:r>
+              <a:rPr lang="fr-FR" dirty="0" smtClean="0"/>
+              <a:t>Certains sont importants :</a:t>
+            </a:r>
+          </a:p>
+          <a:p>
+            <a:pPr lvl="2"/>
+            <a:r>
+              <a:rPr lang="fr-FR" dirty="0" smtClean="0">
+                <a:latin typeface="Monaco"/>
+                <a:cs typeface="Monaco"/>
+              </a:rPr>
+              <a:t>x &lt;- 1 </a:t>
+            </a:r>
+            <a:r>
+              <a:rPr lang="fr-FR" dirty="0" smtClean="0"/>
+              <a:t>: x prend la valeur 1</a:t>
+            </a:r>
+          </a:p>
+          <a:p>
+            <a:pPr lvl="2"/>
+            <a:r>
+              <a:rPr lang="fr-FR" dirty="0">
+                <a:latin typeface="Monaco"/>
+                <a:cs typeface="Monaco"/>
+              </a:rPr>
+              <a:t>x</a:t>
+            </a:r>
+            <a:r>
+              <a:rPr lang="fr-FR" dirty="0" smtClean="0">
+                <a:latin typeface="Monaco"/>
+                <a:cs typeface="Monaco"/>
+              </a:rPr>
+              <a:t> &lt; -1 </a:t>
+            </a:r>
+            <a:r>
+              <a:rPr lang="fr-FR" dirty="0" smtClean="0"/>
+              <a:t>: teste si x est plus petit que -1</a:t>
+            </a:r>
+          </a:p>
+          <a:p>
+            <a:pPr lvl="2"/>
+            <a:endParaRPr lang="fr-FR" dirty="0"/>
+          </a:p>
+          <a:p>
+            <a:pPr lvl="1"/>
+            <a:r>
+              <a:rPr lang="fr-FR" dirty="0" smtClean="0"/>
+              <a:t>D’autres servent à la lisibilité :</a:t>
+            </a:r>
+          </a:p>
+          <a:p>
+            <a:pPr lvl="2"/>
+            <a:r>
+              <a:rPr lang="fr-FR" dirty="0">
+                <a:latin typeface="Monaco"/>
+                <a:cs typeface="Monaco"/>
+              </a:rPr>
+              <a:t>x &lt;- </a:t>
+            </a:r>
+            <a:r>
+              <a:rPr lang="fr-FR" dirty="0" smtClean="0">
+                <a:latin typeface="Monaco"/>
+                <a:cs typeface="Monaco"/>
+              </a:rPr>
+              <a:t>-1 </a:t>
+            </a:r>
+          </a:p>
+          <a:p>
+            <a:pPr lvl="2"/>
+            <a:r>
+              <a:rPr lang="fr-FR" dirty="0" smtClean="0">
+                <a:latin typeface="Monaco"/>
+                <a:cs typeface="Monaco"/>
+                <a:sym typeface="Wingdings"/>
+              </a:rPr>
+              <a:t>x &lt;--1</a:t>
+            </a:r>
+          </a:p>
+          <a:p>
+            <a:pPr lvl="2"/>
+            <a:endParaRPr lang="fr-FR" dirty="0" smtClean="0">
+              <a:latin typeface="Monaco"/>
+              <a:cs typeface="Monaco"/>
+              <a:sym typeface="Wingdings"/>
+            </a:endParaRPr>
+          </a:p>
+          <a:p>
+            <a:r>
+              <a:rPr lang="fr-FR" dirty="0" smtClean="0"/>
+              <a:t>« un code bien aéré est plus facile à debugger »</a:t>
+            </a:r>
+            <a:endParaRPr lang="fr-FR" dirty="0"/>
           </a:p>
         </p:txBody>
       </p:sp>
     </p:spTree>
     <p:extLst>
       <p:ext uri="{BB962C8B-B14F-4D97-AF65-F5344CB8AC3E}">
-        <p14:creationId xmlns:p14="http://schemas.microsoft.com/office/powerpoint/2010/main" val="448359510"/>
+        <p14:creationId xmlns:p14="http://schemas.microsoft.com/office/powerpoint/2010/main" val="1299333516"/>
       </p:ext>
     </p:extLst>
   </p:cSld>
@@ -4794,7 +5979,7 @@
           <a:p>
             <a:r>
               <a:rPr lang="fr-FR" dirty="0" smtClean="0"/>
-              <a:t>Facteur</a:t>
+              <a:t>Ressource, Aide</a:t>
             </a:r>
             <a:endParaRPr lang="fr-FR" dirty="0"/>
           </a:p>
@@ -4810,19 +5995,57 @@
             <p:ph idx="1"/>
           </p:nvPr>
         </p:nvSpPr>
-        <p:spPr/>
-        <p:txBody>
-          <a:bodyPr/>
-          <a:lstStyle/>
-          <a:p>
-            <a:endParaRPr lang="fr-FR"/>
-          </a:p>
-        </p:txBody>
-      </p:sp>
+        <p:spPr>
+          <a:xfrm>
+            <a:off x="457200" y="1600200"/>
+            <a:ext cx="8229600" cy="676031"/>
+          </a:xfrm>
+        </p:spPr>
+        <p:txBody>
+          <a:bodyPr/>
+          <a:lstStyle/>
+          <a:p>
+            <a:r>
+              <a:rPr lang="fr-FR" dirty="0" smtClean="0"/>
+              <a:t>Depuis le « prompt », directement dans R :</a:t>
+            </a:r>
+          </a:p>
+        </p:txBody>
+      </p:sp>
+      <p:pic>
+        <p:nvPicPr>
+          <p:cNvPr id="4" name="Image 3" descr="Capture d’écran 2016-10-17 à 21.33.49.png"/>
+          <p:cNvPicPr>
+            <a:picLocks noChangeAspect="1"/>
+          </p:cNvPicPr>
+          <p:nvPr/>
+        </p:nvPicPr>
+        <p:blipFill>
+          <a:blip r:embed="rId2">
+            <a:extLst>
+              <a:ext uri="{28A0092B-C50C-407E-A947-70E740481C1C}">
+                <a14:useLocalDpi xmlns:a14="http://schemas.microsoft.com/office/drawing/2010/main" val="0"/>
+              </a:ext>
+            </a:extLst>
+          </a:blip>
+          <a:stretch>
+            <a:fillRect/>
+          </a:stretch>
+        </p:blipFill>
+        <p:spPr>
+          <a:xfrm>
+            <a:off x="908536" y="2276231"/>
+            <a:ext cx="7317153" cy="3774501"/>
+          </a:xfrm>
+          <a:prstGeom prst="rect">
+            <a:avLst/>
+          </a:prstGeom>
+        </p:spPr>
+      </p:pic>
     </p:spTree>
     <p:extLst>
       <p:ext uri="{BB962C8B-B14F-4D97-AF65-F5344CB8AC3E}">
-        <p14:creationId xmlns:p14="http://schemas.microsoft.com/office/powerpoint/2010/main" val="152058204"/>
+        <p14:creationId xmlns:p14="http://schemas.microsoft.com/office/powerpoint/2010/main" val="1072023923"/>
       </p:ext>
     </p:extLst>
   </p:cSld>
@@ -4859,47 +6082,109 @@
             <p:ph type="title"/>
           </p:nvPr>
         </p:nvSpPr>
+        <p:spPr/>
+        <p:txBody>
+          <a:bodyPr/>
+          <a:lstStyle/>
+          <a:p>
+            <a:r>
+              <a:rPr lang="fr-FR" dirty="0" smtClean="0"/>
+              <a:t>Ressource, Aide</a:t>
+            </a:r>
+            <a:endParaRPr lang="fr-FR" dirty="0"/>
+          </a:p>
+        </p:txBody>
+      </p:sp>
+      <p:sp>
+        <p:nvSpPr>
+          <p:cNvPr id="3" name="Espace réservé du contenu 2"/>
+          <p:cNvSpPr>
+            <a:spLocks noGrp="1"/>
+          </p:cNvSpPr>
+          <p:nvPr>
+            <p:ph idx="1"/>
+          </p:nvPr>
+        </p:nvSpPr>
         <p:spPr>
           <a:xfrm>
-            <a:off x="466969" y="274638"/>
-            <a:ext cx="8229600" cy="1143000"/>
+            <a:off x="457200" y="1600200"/>
+            <a:ext cx="8229600" cy="3313723"/>
           </a:xfrm>
         </p:spPr>
         <p:txBody>
-          <a:bodyPr/>
-          <a:lstStyle/>
-          <a:p>
-            <a:r>
-              <a:rPr lang="fr-FR" dirty="0" smtClean="0"/>
-              <a:t>Matrice</a:t>
+          <a:bodyPr>
+            <a:normAutofit/>
+          </a:bodyPr>
+          <a:lstStyle/>
+          <a:p>
+            <a:r>
+              <a:rPr lang="fr-FR" dirty="0" smtClean="0"/>
+              <a:t>Communauté  :</a:t>
+            </a:r>
+          </a:p>
+          <a:p>
+            <a:pPr lvl="1"/>
+            <a:r>
+              <a:rPr lang="fr-FR" dirty="0" smtClean="0"/>
+              <a:t>Quick</a:t>
+            </a:r>
+            <a:r>
+              <a:rPr lang="fr-FR" dirty="0"/>
+              <a:t>-R </a:t>
+            </a:r>
+            <a:r>
+              <a:rPr lang="fr-FR" dirty="0" smtClean="0"/>
+              <a:t>: </a:t>
+            </a:r>
+            <a:r>
+              <a:rPr lang="fr-FR" dirty="0" smtClean="0">
+                <a:hlinkClick r:id="rId2"/>
+              </a:rPr>
+              <a:t>http</a:t>
+            </a:r>
+            <a:r>
+              <a:rPr lang="fr-FR" dirty="0">
+                <a:hlinkClick r:id="rId2"/>
+              </a:rPr>
+              <a:t>://www.statmethods.net/</a:t>
+            </a:r>
+            <a:r>
+              <a:rPr lang="fr-FR" dirty="0"/>
+              <a:t> </a:t>
+            </a:r>
+            <a:endParaRPr lang="fr-FR" dirty="0" smtClean="0"/>
+          </a:p>
+          <a:p>
+            <a:pPr lvl="1"/>
+            <a:r>
+              <a:rPr lang="fr-FR" dirty="0">
+                <a:hlinkClick r:id="rId3"/>
+              </a:rPr>
+              <a:t>http://www.duclert.org/</a:t>
+            </a:r>
+            <a:r>
+              <a:rPr lang="fr-FR" dirty="0"/>
+              <a:t> </a:t>
+            </a:r>
+          </a:p>
+          <a:p>
+            <a:pPr lvl="1"/>
+            <a:r>
+              <a:rPr lang="fr-FR" dirty="0" err="1" smtClean="0"/>
+              <a:t>Etc</a:t>
+            </a:r>
+            <a:r>
+              <a:rPr lang="fr-FR" dirty="0" smtClean="0"/>
+              <a:t> …</a:t>
             </a:r>
             <a:endParaRPr lang="fr-FR" dirty="0"/>
-          </a:p>
-        </p:txBody>
-      </p:sp>
-      <p:sp>
-        <p:nvSpPr>
-          <p:cNvPr id="3" name="Espace réservé du contenu 2"/>
-          <p:cNvSpPr>
-            <a:spLocks noGrp="1"/>
-          </p:cNvSpPr>
-          <p:nvPr>
-            <p:ph idx="1"/>
-          </p:nvPr>
-        </p:nvSpPr>
-        <p:spPr/>
-        <p:txBody>
-          <a:bodyPr/>
-          <a:lstStyle/>
-          <a:p>
-            <a:endParaRPr lang="fr-FR"/>
           </a:p>
         </p:txBody>
       </p:sp>
     </p:spTree>
     <p:extLst>
       <p:ext uri="{BB962C8B-B14F-4D97-AF65-F5344CB8AC3E}">
-        <p14:creationId xmlns:p14="http://schemas.microsoft.com/office/powerpoint/2010/main" val="152058204"/>
+        <p14:creationId xmlns:p14="http://schemas.microsoft.com/office/powerpoint/2010/main" val="2379062317"/>
       </p:ext>
     </p:extLst>
   </p:cSld>

</xml_diff>